<commit_message>
Update Energy Consumtion Presentation.pptx
</commit_message>
<xml_diff>
--- a/Energy Consumtion Presentation.pptx
+++ b/Energy Consumtion Presentation.pptx
@@ -8,13 +8,14 @@
     <p:sldId id="256" r:id="rId2"/>
     <p:sldId id="257" r:id="rId3"/>
     <p:sldId id="258" r:id="rId4"/>
-    <p:sldId id="259" r:id="rId5"/>
-    <p:sldId id="260" r:id="rId6"/>
-    <p:sldId id="261" r:id="rId7"/>
-    <p:sldId id="262" r:id="rId8"/>
-    <p:sldId id="263" r:id="rId9"/>
-    <p:sldId id="264" r:id="rId10"/>
-    <p:sldId id="265" r:id="rId11"/>
+    <p:sldId id="260" r:id="rId5"/>
+    <p:sldId id="267" r:id="rId6"/>
+    <p:sldId id="266" r:id="rId7"/>
+    <p:sldId id="261" r:id="rId8"/>
+    <p:sldId id="262" r:id="rId9"/>
+    <p:sldId id="263" r:id="rId10"/>
+    <p:sldId id="264" r:id="rId11"/>
+    <p:sldId id="265" r:id="rId12"/>
   </p:sldIdLst>
   <p:sldSz cx="12192000" cy="6858000"/>
   <p:notesSz cx="6858000" cy="9144000"/>
@@ -113,6 +114,11 @@
       </a:defRPr>
     </a:lvl9pPr>
   </p:defaultTextStyle>
+  <p:extLst>
+    <p:ext uri="{EFAFB233-063F-42B5-8137-9DF3F51BA10A}">
+      <p15:sldGuideLst xmlns:p15="http://schemas.microsoft.com/office/powerpoint/2012/main"/>
+    </p:ext>
+  </p:extLst>
 </p:presentation>
 </file>
 
@@ -6577,6 +6583,114 @@
       </p:grpSpPr>
       <p:sp>
         <p:nvSpPr>
+          <p:cNvPr id="2" name="Title 1">
+            <a:extLst>
+              <a:ext uri="{FF2B5EF4-FFF2-40B4-BE49-F238E27FC236}">
+                <a16:creationId xmlns:a16="http://schemas.microsoft.com/office/drawing/2014/main" id="{4B4773A9-33C0-3C4D-993B-1872A43A04F1}"/>
+              </a:ext>
+            </a:extLst>
+          </p:cNvPr>
+          <p:cNvSpPr>
+            <a:spLocks noGrp="1"/>
+          </p:cNvSpPr>
+          <p:nvPr>
+            <p:ph type="title"/>
+          </p:nvPr>
+        </p:nvSpPr>
+        <p:spPr>
+          <a:xfrm>
+            <a:off x="581192" y="702156"/>
+            <a:ext cx="11029616" cy="1013800"/>
+          </a:xfrm>
+        </p:spPr>
+        <p:txBody>
+          <a:bodyPr>
+            <a:normAutofit/>
+          </a:bodyPr>
+          <a:lstStyle/>
+          <a:p>
+            <a:r>
+              <a:rPr lang="en-IL">
+                <a:solidFill>
+                  <a:srgbClr val="FFFEFF"/>
+                </a:solidFill>
+              </a:rPr>
+              <a:t>Improving the model</a:t>
+            </a:r>
+          </a:p>
+        </p:txBody>
+      </p:sp>
+      <p:graphicFrame>
+        <p:nvGraphicFramePr>
+          <p:cNvPr id="5" name="Content Placeholder 2">
+            <a:extLst>
+              <a:ext uri="{FF2B5EF4-FFF2-40B4-BE49-F238E27FC236}">
+                <a16:creationId xmlns:a16="http://schemas.microsoft.com/office/drawing/2014/main" id="{C2F48519-9EB4-4EE3-B904-8DB417EF49DC}"/>
+              </a:ext>
+            </a:extLst>
+          </p:cNvPr>
+          <p:cNvGraphicFramePr>
+            <a:graphicFrameLocks noGrp="1"/>
+          </p:cNvGraphicFramePr>
+          <p:nvPr>
+            <p:ph idx="1"/>
+            <p:extLst>
+              <p:ext uri="{D42A27DB-BD31-4B8C-83A1-F6EECF244321}">
+                <p14:modId xmlns:p14="http://schemas.microsoft.com/office/powerpoint/2010/main" val="2284010815"/>
+              </p:ext>
+            </p:extLst>
+          </p:nvPr>
+        </p:nvGraphicFramePr>
+        <p:xfrm>
+          <a:off x="581025" y="2181225"/>
+          <a:ext cx="11029950" cy="3678238"/>
+        </p:xfrm>
+        <a:graphic>
+          <a:graphicData uri="http://schemas.openxmlformats.org/drawingml/2006/diagram">
+            <dgm:relIds xmlns:dgm="http://schemas.openxmlformats.org/drawingml/2006/diagram" xmlns:r="http://schemas.openxmlformats.org/officeDocument/2006/relationships" r:dm="rId2" r:lo="rId3" r:qs="rId4" r:cs="rId5"/>
+          </a:graphicData>
+        </a:graphic>
+      </p:graphicFrame>
+    </p:spTree>
+    <p:extLst>
+      <p:ext uri="{BB962C8B-B14F-4D97-AF65-F5344CB8AC3E}">
+        <p14:creationId xmlns:p14="http://schemas.microsoft.com/office/powerpoint/2010/main" val="269441500"/>
+      </p:ext>
+    </p:extLst>
+  </p:cSld>
+  <p:clrMapOvr>
+    <a:masterClrMapping/>
+  </p:clrMapOvr>
+</p:sld>
+</file>
+
+<file path=ppt/slides/slide11.xml><?xml version="1.0" encoding="utf-8"?>
+<p:sld xmlns:a="http://schemas.openxmlformats.org/drawingml/2006/main" xmlns:r="http://schemas.openxmlformats.org/officeDocument/2006/relationships" xmlns:p="http://schemas.openxmlformats.org/presentationml/2006/main">
+  <p:cSld>
+    <p:bg>
+      <p:bgPr>
+        <a:solidFill>
+          <a:schemeClr val="bg1"/>
+        </a:solidFill>
+        <a:effectLst/>
+      </p:bgPr>
+    </p:bg>
+    <p:spTree>
+      <p:nvGrpSpPr>
+        <p:cNvPr id="1" name=""/>
+        <p:cNvGrpSpPr/>
+        <p:nvPr/>
+      </p:nvGrpSpPr>
+      <p:grpSpPr>
+        <a:xfrm>
+          <a:off x="0" y="0"/>
+          <a:ext cx="0" cy="0"/>
+          <a:chOff x="0" y="0"/>
+          <a:chExt cx="0" cy="0"/>
+        </a:xfrm>
+      </p:grpSpPr>
+      <p:sp>
+        <p:nvSpPr>
           <p:cNvPr id="7" name="Rectangle 6">
             <a:extLst>
               <a:ext uri="{FF2B5EF4-FFF2-40B4-BE49-F238E27FC236}">
@@ -7787,7 +7901,7 @@
           <a:lstStyle/>
           <a:p>
             <a:r>
-              <a:rPr lang="en-IL" sz="2000">
+              <a:rPr lang="en-IL" sz="2000" dirty="0">
                 <a:solidFill>
                   <a:schemeClr val="accent2">
                     <a:lumMod val="50000"/>
@@ -7799,7 +7913,19 @@
           </a:p>
           <a:p>
             <a:r>
-              <a:rPr lang="en-IL" sz="2000">
+              <a:rPr lang="en-IL" sz="2000" dirty="0">
+                <a:solidFill>
+                  <a:schemeClr val="accent2">
+                    <a:lumMod val="50000"/>
+                  </a:schemeClr>
+                </a:solidFill>
+              </a:rPr>
+              <a:t>Forward fill was used to fill in the days with missing temperature readings</a:t>
+            </a:r>
+          </a:p>
+          <a:p>
+            <a:r>
+              <a:rPr lang="en-IL" sz="2000" dirty="0">
                 <a:solidFill>
                   <a:schemeClr val="accent2">
                     <a:lumMod val="50000"/>
@@ -7811,7 +7937,7 @@
           </a:p>
           <a:p>
             <a:r>
-              <a:rPr lang="en-IL" sz="2000">
+              <a:rPr lang="en-IL" sz="2000" dirty="0">
                 <a:solidFill>
                   <a:schemeClr val="accent2">
                     <a:lumMod val="50000"/>
@@ -7821,7 +7947,7 @@
               <a:t>Using the </a:t>
             </a:r>
             <a:r>
-              <a:rPr lang="en-IL" sz="2000">
+              <a:rPr lang="en-IL" sz="2000" dirty="0">
                 <a:solidFill>
                   <a:schemeClr val="accent2">
                     <a:lumMod val="50000"/>
@@ -7832,7 +7958,7 @@
               <a:t>holidays</a:t>
             </a:r>
             <a:r>
-              <a:rPr lang="en-IL" sz="2000">
+              <a:rPr lang="en-IL" sz="2000" dirty="0">
                 <a:solidFill>
                   <a:schemeClr val="accent2">
                     <a:lumMod val="50000"/>
@@ -7844,7 +7970,7 @@
           </a:p>
           <a:p>
             <a:r>
-              <a:rPr lang="en-IL" sz="2000">
+              <a:rPr lang="en-IL" sz="2000" dirty="0">
                 <a:solidFill>
                   <a:schemeClr val="accent2">
                     <a:lumMod val="50000"/>
@@ -7870,6 +7996,709 @@
 </file>
 
 <file path=ppt/slides/slide4.xml><?xml version="1.0" encoding="utf-8"?>
+<p:sld xmlns:a="http://schemas.openxmlformats.org/drawingml/2006/main" xmlns:r="http://schemas.openxmlformats.org/officeDocument/2006/relationships" xmlns:p="http://schemas.openxmlformats.org/presentationml/2006/main">
+  <p:cSld>
+    <p:bg>
+      <p:bgPr>
+        <a:solidFill>
+          <a:schemeClr val="bg2"/>
+        </a:solidFill>
+        <a:effectLst/>
+      </p:bgPr>
+    </p:bg>
+    <p:spTree>
+      <p:nvGrpSpPr>
+        <p:cNvPr id="1" name=""/>
+        <p:cNvGrpSpPr/>
+        <p:nvPr/>
+      </p:nvGrpSpPr>
+      <p:grpSpPr>
+        <a:xfrm>
+          <a:off x="0" y="0"/>
+          <a:ext cx="0" cy="0"/>
+          <a:chOff x="0" y="0"/>
+          <a:chExt cx="0" cy="0"/>
+        </a:xfrm>
+      </p:grpSpPr>
+      <p:sp>
+        <p:nvSpPr>
+          <p:cNvPr id="32" name="Rectangle 31">
+            <a:extLst>
+              <a:ext uri="{FF2B5EF4-FFF2-40B4-BE49-F238E27FC236}">
+                <a16:creationId xmlns:a16="http://schemas.microsoft.com/office/drawing/2014/main" id="{1E5E4503-CC62-4DA9-9121-0A15719984CE}"/>
+              </a:ext>
+              <a:ext uri="{C183D7F6-B498-43B3-948B-1728B52AA6E4}">
+                <adec:decorative xmlns:adec="http://schemas.microsoft.com/office/drawing/2017/decorative" val="1"/>
+              </a:ext>
+            </a:extLst>
+          </p:cNvPr>
+          <p:cNvSpPr>
+            <a:spLocks noGrp="1" noRot="1" noChangeAspect="1" noMove="1" noResize="1" noEditPoints="1" noAdjustHandles="1" noChangeArrowheads="1" noChangeShapeType="1" noTextEdit="1"/>
+          </p:cNvSpPr>
+          <p:nvPr>
+            <p:extLst>
+              <p:ext uri="{386F3935-93C4-4BCD-93E2-E3B085C9AB24}">
+                <p16:designElem xmlns:p16="http://schemas.microsoft.com/office/powerpoint/2015/main" val="1"/>
+              </p:ext>
+            </p:extLst>
+          </p:nvPr>
+        </p:nvSpPr>
+        <p:spPr>
+          <a:xfrm>
+            <a:off x="446534" y="457200"/>
+            <a:ext cx="3703320" cy="94997"/>
+          </a:xfrm>
+          <a:prstGeom prst="rect">
+            <a:avLst/>
+          </a:prstGeom>
+          <a:solidFill>
+            <a:schemeClr val="accent1"/>
+          </a:solidFill>
+          <a:ln>
+            <a:noFill/>
+          </a:ln>
+          <a:effectLst/>
+        </p:spPr>
+        <p:style>
+          <a:lnRef idx="1">
+            <a:schemeClr val="accent1"/>
+          </a:lnRef>
+          <a:fillRef idx="3">
+            <a:schemeClr val="accent1"/>
+          </a:fillRef>
+          <a:effectRef idx="2">
+            <a:schemeClr val="accent1"/>
+          </a:effectRef>
+          <a:fontRef idx="minor">
+            <a:schemeClr val="lt1"/>
+          </a:fontRef>
+        </p:style>
+      </p:sp>
+      <p:sp>
+        <p:nvSpPr>
+          <p:cNvPr id="34" name="Rectangle 33">
+            <a:extLst>
+              <a:ext uri="{FF2B5EF4-FFF2-40B4-BE49-F238E27FC236}">
+                <a16:creationId xmlns:a16="http://schemas.microsoft.com/office/drawing/2014/main" id="{D8D61A1B-3C4C-4F0E-965F-15837624CF5B}"/>
+              </a:ext>
+              <a:ext uri="{C183D7F6-B498-43B3-948B-1728B52AA6E4}">
+                <adec:decorative xmlns:adec="http://schemas.microsoft.com/office/drawing/2017/decorative" val="1"/>
+              </a:ext>
+            </a:extLst>
+          </p:cNvPr>
+          <p:cNvSpPr>
+            <a:spLocks noGrp="1" noRot="1" noChangeAspect="1" noMove="1" noResize="1" noEditPoints="1" noAdjustHandles="1" noChangeArrowheads="1" noChangeShapeType="1" noTextEdit="1"/>
+          </p:cNvSpPr>
+          <p:nvPr>
+            <p:extLst>
+              <p:ext uri="{386F3935-93C4-4BCD-93E2-E3B085C9AB24}">
+                <p16:designElem xmlns:p16="http://schemas.microsoft.com/office/powerpoint/2015/main" val="1"/>
+              </p:ext>
+            </p:extLst>
+          </p:nvPr>
+        </p:nvSpPr>
+        <p:spPr>
+          <a:xfrm>
+            <a:off x="8042147" y="453643"/>
+            <a:ext cx="3703320" cy="98554"/>
+          </a:xfrm>
+          <a:prstGeom prst="rect">
+            <a:avLst/>
+          </a:prstGeom>
+          <a:solidFill>
+            <a:schemeClr val="accent4"/>
+          </a:solidFill>
+          <a:ln>
+            <a:noFill/>
+          </a:ln>
+          <a:effectLst/>
+        </p:spPr>
+        <p:style>
+          <a:lnRef idx="1">
+            <a:schemeClr val="accent1"/>
+          </a:lnRef>
+          <a:fillRef idx="3">
+            <a:schemeClr val="accent1"/>
+          </a:fillRef>
+          <a:effectRef idx="2">
+            <a:schemeClr val="accent1"/>
+          </a:effectRef>
+          <a:fontRef idx="minor">
+            <a:schemeClr val="lt1"/>
+          </a:fontRef>
+        </p:style>
+      </p:sp>
+      <p:sp>
+        <p:nvSpPr>
+          <p:cNvPr id="36" name="Rectangle 35">
+            <a:extLst>
+              <a:ext uri="{FF2B5EF4-FFF2-40B4-BE49-F238E27FC236}">
+                <a16:creationId xmlns:a16="http://schemas.microsoft.com/office/drawing/2014/main" id="{00E56243-9701-44E8-8A92-319433305195}"/>
+              </a:ext>
+              <a:ext uri="{C183D7F6-B498-43B3-948B-1728B52AA6E4}">
+                <adec:decorative xmlns:adec="http://schemas.microsoft.com/office/drawing/2017/decorative" val="1"/>
+              </a:ext>
+            </a:extLst>
+          </p:cNvPr>
+          <p:cNvSpPr>
+            <a:spLocks noGrp="1" noRot="1" noChangeAspect="1" noMove="1" noResize="1" noEditPoints="1" noAdjustHandles="1" noChangeArrowheads="1" noChangeShapeType="1" noTextEdit="1"/>
+          </p:cNvSpPr>
+          <p:nvPr>
+            <p:extLst>
+              <p:ext uri="{386F3935-93C4-4BCD-93E2-E3B085C9AB24}">
+                <p16:designElem xmlns:p16="http://schemas.microsoft.com/office/powerpoint/2015/main" val="1"/>
+              </p:ext>
+            </p:extLst>
+          </p:nvPr>
+        </p:nvSpPr>
+        <p:spPr>
+          <a:xfrm>
+            <a:off x="4241830" y="457200"/>
+            <a:ext cx="3703320" cy="91440"/>
+          </a:xfrm>
+          <a:prstGeom prst="rect">
+            <a:avLst/>
+          </a:prstGeom>
+          <a:solidFill>
+            <a:schemeClr val="accent2"/>
+          </a:solidFill>
+          <a:ln>
+            <a:noFill/>
+          </a:ln>
+          <a:effectLst/>
+        </p:spPr>
+        <p:style>
+          <a:lnRef idx="1">
+            <a:schemeClr val="accent1"/>
+          </a:lnRef>
+          <a:fillRef idx="3">
+            <a:schemeClr val="accent1"/>
+          </a:fillRef>
+          <a:effectRef idx="2">
+            <a:schemeClr val="accent1"/>
+          </a:effectRef>
+          <a:fontRef idx="minor">
+            <a:schemeClr val="lt1"/>
+          </a:fontRef>
+        </p:style>
+      </p:sp>
+      <p:sp>
+        <p:nvSpPr>
+          <p:cNvPr id="38" name="Rectangle 37">
+            <a:extLst>
+              <a:ext uri="{FF2B5EF4-FFF2-40B4-BE49-F238E27FC236}">
+                <a16:creationId xmlns:a16="http://schemas.microsoft.com/office/drawing/2014/main" id="{982B322E-34C4-40A4-91E5-53D60DE973F8}"/>
+              </a:ext>
+              <a:ext uri="{C183D7F6-B498-43B3-948B-1728B52AA6E4}">
+                <adec:decorative xmlns:adec="http://schemas.microsoft.com/office/drawing/2017/decorative" val="1"/>
+              </a:ext>
+            </a:extLst>
+          </p:cNvPr>
+          <p:cNvSpPr>
+            <a:spLocks noGrp="1" noRot="1" noChangeAspect="1" noMove="1" noResize="1" noEditPoints="1" noAdjustHandles="1" noChangeArrowheads="1" noChangeShapeType="1" noTextEdit="1"/>
+          </p:cNvSpPr>
+          <p:nvPr>
+            <p:extLst>
+              <p:ext uri="{386F3935-93C4-4BCD-93E2-E3B085C9AB24}">
+                <p16:designElem xmlns:p16="http://schemas.microsoft.com/office/powerpoint/2015/main" val="1"/>
+              </p:ext>
+            </p:extLst>
+          </p:nvPr>
+        </p:nvSpPr>
+        <p:spPr>
+          <a:xfrm>
+            <a:off x="440286" y="614407"/>
+            <a:ext cx="11309338" cy="1189298"/>
+          </a:xfrm>
+          <a:prstGeom prst="rect">
+            <a:avLst/>
+          </a:prstGeom>
+          <a:solidFill>
+            <a:schemeClr val="accent1"/>
+          </a:solidFill>
+          <a:ln>
+            <a:noFill/>
+          </a:ln>
+          <a:effectLst/>
+        </p:spPr>
+        <p:style>
+          <a:lnRef idx="1">
+            <a:schemeClr val="accent1"/>
+          </a:lnRef>
+          <a:fillRef idx="3">
+            <a:schemeClr val="accent1"/>
+          </a:fillRef>
+          <a:effectRef idx="2">
+            <a:schemeClr val="accent1"/>
+          </a:effectRef>
+          <a:fontRef idx="minor">
+            <a:schemeClr val="lt1"/>
+          </a:fontRef>
+        </p:style>
+      </p:sp>
+      <p:sp>
+        <p:nvSpPr>
+          <p:cNvPr id="40" name="Rectangle 39">
+            <a:extLst>
+              <a:ext uri="{FF2B5EF4-FFF2-40B4-BE49-F238E27FC236}">
+                <a16:creationId xmlns:a16="http://schemas.microsoft.com/office/drawing/2014/main" id="{DFAEE973-9BA8-47FC-978E-9052735A5802}"/>
+              </a:ext>
+              <a:ext uri="{C183D7F6-B498-43B3-948B-1728B52AA6E4}">
+                <adec:decorative xmlns:adec="http://schemas.microsoft.com/office/drawing/2017/decorative" val="1"/>
+              </a:ext>
+            </a:extLst>
+          </p:cNvPr>
+          <p:cNvSpPr>
+            <a:spLocks noGrp="1" noRot="1" noChangeAspect="1" noMove="1" noResize="1" noEditPoints="1" noAdjustHandles="1" noChangeArrowheads="1" noChangeShapeType="1" noTextEdit="1"/>
+          </p:cNvSpPr>
+          <p:nvPr>
+            <p:extLst>
+              <p:ext uri="{386F3935-93C4-4BCD-93E2-E3B085C9AB24}">
+                <p16:designElem xmlns:p16="http://schemas.microsoft.com/office/powerpoint/2015/main" val="1"/>
+              </p:ext>
+            </p:extLst>
+          </p:nvPr>
+        </p:nvSpPr>
+        <p:spPr>
+          <a:xfrm>
+            <a:off x="0" y="-460"/>
+            <a:ext cx="12188952" cy="6858460"/>
+          </a:xfrm>
+          <a:prstGeom prst="rect">
+            <a:avLst/>
+          </a:prstGeom>
+          <a:solidFill>
+            <a:srgbClr val="FFFFFF"/>
+          </a:solidFill>
+          <a:ln>
+            <a:noFill/>
+          </a:ln>
+        </p:spPr>
+        <p:style>
+          <a:lnRef idx="2">
+            <a:schemeClr val="accent1">
+              <a:shade val="50000"/>
+            </a:schemeClr>
+          </a:lnRef>
+          <a:fillRef idx="1">
+            <a:schemeClr val="accent1"/>
+          </a:fillRef>
+          <a:effectRef idx="0">
+            <a:schemeClr val="accent1"/>
+          </a:effectRef>
+          <a:fontRef idx="minor">
+            <a:schemeClr val="lt1"/>
+          </a:fontRef>
+        </p:style>
+        <p:txBody>
+          <a:bodyPr rtlCol="0" anchor="ctr"/>
+          <a:lstStyle/>
+          <a:p>
+            <a:pPr algn="ctr"/>
+            <a:endParaRPr lang="en-US"/>
+          </a:p>
+        </p:txBody>
+      </p:sp>
+      <p:sp>
+        <p:nvSpPr>
+          <p:cNvPr id="42" name="Rectangle 41">
+            <a:extLst>
+              <a:ext uri="{FF2B5EF4-FFF2-40B4-BE49-F238E27FC236}">
+                <a16:creationId xmlns:a16="http://schemas.microsoft.com/office/drawing/2014/main" id="{B1ACEF87-056E-4E77-899B-9E9A04E9B574}"/>
+              </a:ext>
+              <a:ext uri="{C183D7F6-B498-43B3-948B-1728B52AA6E4}">
+                <adec:decorative xmlns:adec="http://schemas.microsoft.com/office/drawing/2017/decorative" val="1"/>
+              </a:ext>
+            </a:extLst>
+          </p:cNvPr>
+          <p:cNvSpPr>
+            <a:spLocks noGrp="1" noRot="1" noChangeAspect="1" noMove="1" noResize="1" noEditPoints="1" noAdjustHandles="1" noChangeArrowheads="1" noChangeShapeType="1" noTextEdit="1"/>
+          </p:cNvSpPr>
+          <p:nvPr>
+            <p:extLst>
+              <p:ext uri="{386F3935-93C4-4BCD-93E2-E3B085C9AB24}">
+                <p16:designElem xmlns:p16="http://schemas.microsoft.com/office/powerpoint/2015/main" val="1"/>
+              </p:ext>
+            </p:extLst>
+          </p:nvPr>
+        </p:nvSpPr>
+        <p:spPr>
+          <a:xfrm>
+            <a:off x="0" y="3383280"/>
+            <a:ext cx="6096000" cy="3474720"/>
+          </a:xfrm>
+          <a:prstGeom prst="rect">
+            <a:avLst/>
+          </a:prstGeom>
+          <a:solidFill>
+            <a:schemeClr val="accent1"/>
+          </a:solidFill>
+          <a:ln w="6350" cmpd="sng">
+            <a:noFill/>
+          </a:ln>
+          <a:effectLst/>
+        </p:spPr>
+        <p:style>
+          <a:lnRef idx="1">
+            <a:schemeClr val="accent1"/>
+          </a:lnRef>
+          <a:fillRef idx="3">
+            <a:schemeClr val="accent1"/>
+          </a:fillRef>
+          <a:effectRef idx="2">
+            <a:schemeClr val="accent1"/>
+          </a:effectRef>
+          <a:fontRef idx="minor">
+            <a:schemeClr val="lt1"/>
+          </a:fontRef>
+        </p:style>
+      </p:sp>
+      <p:sp>
+        <p:nvSpPr>
+          <p:cNvPr id="2" name="Title 1">
+            <a:extLst>
+              <a:ext uri="{FF2B5EF4-FFF2-40B4-BE49-F238E27FC236}">
+                <a16:creationId xmlns:a16="http://schemas.microsoft.com/office/drawing/2014/main" id="{5C6E1396-3D15-2F47-9479-046FA62442E2}"/>
+              </a:ext>
+            </a:extLst>
+          </p:cNvPr>
+          <p:cNvSpPr>
+            <a:spLocks noGrp="1"/>
+          </p:cNvSpPr>
+          <p:nvPr>
+            <p:ph type="title"/>
+          </p:nvPr>
+        </p:nvSpPr>
+        <p:spPr>
+          <a:xfrm>
+            <a:off x="584200" y="3708142"/>
+            <a:ext cx="5139775" cy="829048"/>
+          </a:xfrm>
+        </p:spPr>
+        <p:txBody>
+          <a:bodyPr vert="horz" lIns="91440" tIns="45720" rIns="91440" bIns="45720" rtlCol="0" anchor="ctr">
+            <a:normAutofit/>
+          </a:bodyPr>
+          <a:lstStyle/>
+          <a:p>
+            <a:r>
+              <a:rPr lang="en-US">
+                <a:solidFill>
+                  <a:srgbClr val="FFFFFF"/>
+                </a:solidFill>
+              </a:rPr>
+              <a:t>Visualizations</a:t>
+            </a:r>
+          </a:p>
+        </p:txBody>
+      </p:sp>
+      <p:pic>
+        <p:nvPicPr>
+          <p:cNvPr id="14" name="Content Placeholder 3">
+            <a:extLst>
+              <a:ext uri="{FF2B5EF4-FFF2-40B4-BE49-F238E27FC236}">
+                <a16:creationId xmlns:a16="http://schemas.microsoft.com/office/drawing/2014/main" id="{5EF79540-3F46-7343-A7DF-90A4CB1BCB26}"/>
+              </a:ext>
+            </a:extLst>
+          </p:cNvPr>
+          <p:cNvPicPr>
+            <a:picLocks noChangeAspect="1"/>
+          </p:cNvPicPr>
+          <p:nvPr/>
+        </p:nvPicPr>
+        <p:blipFill rotWithShape="1">
+          <a:blip r:embed="rId2"/>
+          <a:stretch/>
+        </p:blipFill>
+        <p:spPr>
+          <a:xfrm>
+            <a:off x="676456" y="321733"/>
+            <a:ext cx="4692795" cy="2733553"/>
+          </a:xfrm>
+          <a:prstGeom prst="rect">
+            <a:avLst/>
+          </a:prstGeom>
+        </p:spPr>
+      </p:pic>
+      <p:sp>
+        <p:nvSpPr>
+          <p:cNvPr id="29" name="Content Placeholder 28">
+            <a:extLst>
+              <a:ext uri="{FF2B5EF4-FFF2-40B4-BE49-F238E27FC236}">
+                <a16:creationId xmlns:a16="http://schemas.microsoft.com/office/drawing/2014/main" id="{A8485C2C-175D-4EAE-A107-508DBB0BFCAE}"/>
+              </a:ext>
+            </a:extLst>
+          </p:cNvPr>
+          <p:cNvSpPr>
+            <a:spLocks noGrp="1"/>
+          </p:cNvSpPr>
+          <p:nvPr>
+            <p:ph sz="half" idx="1"/>
+          </p:nvPr>
+        </p:nvSpPr>
+        <p:spPr>
+          <a:xfrm>
+            <a:off x="581193" y="4624173"/>
+            <a:ext cx="5147354" cy="1751226"/>
+          </a:xfrm>
+        </p:spPr>
+        <p:txBody>
+          <a:bodyPr vert="horz" lIns="91440" tIns="45720" rIns="91440" bIns="45720" rtlCol="0" anchor="ctr">
+            <a:normAutofit/>
+          </a:bodyPr>
+          <a:lstStyle/>
+          <a:p>
+            <a:endParaRPr lang="en-US">
+              <a:solidFill>
+                <a:srgbClr val="FFFFFF"/>
+              </a:solidFill>
+            </a:endParaRPr>
+          </a:p>
+        </p:txBody>
+      </p:sp>
+      <p:sp>
+        <p:nvSpPr>
+          <p:cNvPr id="44" name="Rectangle 43">
+            <a:extLst>
+              <a:ext uri="{FF2B5EF4-FFF2-40B4-BE49-F238E27FC236}">
+                <a16:creationId xmlns:a16="http://schemas.microsoft.com/office/drawing/2014/main" id="{DD0C6C3A-73B1-4E33-AD0D-8BCD35B714CD}"/>
+              </a:ext>
+              <a:ext uri="{C183D7F6-B498-43B3-948B-1728B52AA6E4}">
+                <adec:decorative xmlns:adec="http://schemas.microsoft.com/office/drawing/2017/decorative" val="1"/>
+              </a:ext>
+            </a:extLst>
+          </p:cNvPr>
+          <p:cNvSpPr>
+            <a:spLocks noGrp="1" noRot="1" noChangeAspect="1" noMove="1" noResize="1" noEditPoints="1" noAdjustHandles="1" noChangeArrowheads="1" noChangeShapeType="1" noTextEdit="1"/>
+          </p:cNvSpPr>
+          <p:nvPr>
+            <p:extLst>
+              <p:ext uri="{386F3935-93C4-4BCD-93E2-E3B085C9AB24}">
+                <p16:designElem xmlns:p16="http://schemas.microsoft.com/office/powerpoint/2015/main" val="1"/>
+              </p:ext>
+            </p:extLst>
+          </p:nvPr>
+        </p:nvSpPr>
+        <p:spPr>
+          <a:xfrm>
+            <a:off x="6050280" y="-460"/>
+            <a:ext cx="91440" cy="6858000"/>
+          </a:xfrm>
+          <a:prstGeom prst="rect">
+            <a:avLst/>
+          </a:prstGeom>
+          <a:solidFill>
+            <a:schemeClr val="accent1"/>
+          </a:solidFill>
+          <a:ln>
+            <a:noFill/>
+          </a:ln>
+          <a:effectLst/>
+        </p:spPr>
+        <p:style>
+          <a:lnRef idx="1">
+            <a:schemeClr val="accent1"/>
+          </a:lnRef>
+          <a:fillRef idx="3">
+            <a:schemeClr val="accent1"/>
+          </a:fillRef>
+          <a:effectRef idx="2">
+            <a:schemeClr val="accent1"/>
+          </a:effectRef>
+          <a:fontRef idx="minor">
+            <a:schemeClr val="lt1"/>
+          </a:fontRef>
+        </p:style>
+        <p:txBody>
+          <a:bodyPr rtlCol="0" anchor="ctr"/>
+          <a:lstStyle/>
+          <a:p>
+            <a:pPr algn="ctr"/>
+            <a:endParaRPr lang="en-US"/>
+          </a:p>
+        </p:txBody>
+      </p:sp>
+      <p:pic>
+        <p:nvPicPr>
+          <p:cNvPr id="5" name="Content Placeholder 4">
+            <a:extLst>
+              <a:ext uri="{FF2B5EF4-FFF2-40B4-BE49-F238E27FC236}">
+                <a16:creationId xmlns:a16="http://schemas.microsoft.com/office/drawing/2014/main" id="{BC6C109E-99F9-474F-8C8F-5163396244B3}"/>
+              </a:ext>
+            </a:extLst>
+          </p:cNvPr>
+          <p:cNvPicPr>
+            <a:picLocks noChangeAspect="1"/>
+          </p:cNvPicPr>
+          <p:nvPr/>
+        </p:nvPicPr>
+        <p:blipFill>
+          <a:blip r:embed="rId3"/>
+          <a:stretch>
+            <a:fillRect/>
+          </a:stretch>
+        </p:blipFill>
+        <p:spPr>
+          <a:xfrm>
+            <a:off x="6827010" y="321733"/>
+            <a:ext cx="4673600" cy="2734056"/>
+          </a:xfrm>
+          <a:prstGeom prst="rect">
+            <a:avLst/>
+          </a:prstGeom>
+        </p:spPr>
+      </p:pic>
+      <p:sp>
+        <p:nvSpPr>
+          <p:cNvPr id="46" name="Rectangle 45">
+            <a:extLst>
+              <a:ext uri="{FF2B5EF4-FFF2-40B4-BE49-F238E27FC236}">
+                <a16:creationId xmlns:a16="http://schemas.microsoft.com/office/drawing/2014/main" id="{303022F3-BFF5-4104-AE9A-399949DAFC26}"/>
+              </a:ext>
+              <a:ext uri="{C183D7F6-B498-43B3-948B-1728B52AA6E4}">
+                <adec:decorative xmlns:adec="http://schemas.microsoft.com/office/drawing/2017/decorative" val="1"/>
+              </a:ext>
+            </a:extLst>
+          </p:cNvPr>
+          <p:cNvSpPr>
+            <a:spLocks noGrp="1" noRot="1" noChangeAspect="1" noMove="1" noResize="1" noEditPoints="1" noAdjustHandles="1" noChangeArrowheads="1" noChangeShapeType="1" noTextEdit="1"/>
+          </p:cNvSpPr>
+          <p:nvPr>
+            <p:extLst>
+              <p:ext uri="{386F3935-93C4-4BCD-93E2-E3B085C9AB24}">
+                <p16:designElem xmlns:p16="http://schemas.microsoft.com/office/powerpoint/2015/main" val="1"/>
+              </p:ext>
+            </p:extLst>
+          </p:nvPr>
+        </p:nvSpPr>
+        <p:spPr>
+          <a:xfrm>
+            <a:off x="3048" y="3383280"/>
+            <a:ext cx="12188952" cy="91440"/>
+          </a:xfrm>
+          <a:prstGeom prst="rect">
+            <a:avLst/>
+          </a:prstGeom>
+          <a:solidFill>
+            <a:schemeClr val="accent1"/>
+          </a:solidFill>
+          <a:ln>
+            <a:noFill/>
+          </a:ln>
+          <a:effectLst/>
+        </p:spPr>
+        <p:style>
+          <a:lnRef idx="1">
+            <a:schemeClr val="accent1"/>
+          </a:lnRef>
+          <a:fillRef idx="3">
+            <a:schemeClr val="accent1"/>
+          </a:fillRef>
+          <a:effectRef idx="2">
+            <a:schemeClr val="accent1"/>
+          </a:effectRef>
+          <a:fontRef idx="minor">
+            <a:schemeClr val="lt1"/>
+          </a:fontRef>
+        </p:style>
+      </p:sp>
+      <p:pic>
+        <p:nvPicPr>
+          <p:cNvPr id="18" name="Content Placeholder 4">
+            <a:extLst>
+              <a:ext uri="{FF2B5EF4-FFF2-40B4-BE49-F238E27FC236}">
+                <a16:creationId xmlns:a16="http://schemas.microsoft.com/office/drawing/2014/main" id="{0FD764B5-908B-3B4E-B8D6-6110293BD946}"/>
+              </a:ext>
+            </a:extLst>
+          </p:cNvPr>
+          <p:cNvPicPr>
+            <a:picLocks noChangeAspect="1"/>
+          </p:cNvPicPr>
+          <p:nvPr/>
+        </p:nvPicPr>
+        <p:blipFill>
+          <a:blip r:embed="rId4"/>
+          <a:stretch>
+            <a:fillRect/>
+          </a:stretch>
+        </p:blipFill>
+        <p:spPr>
+          <a:xfrm>
+            <a:off x="6724381" y="3802211"/>
+            <a:ext cx="4882243" cy="2734056"/>
+          </a:xfrm>
+          <a:prstGeom prst="rect">
+            <a:avLst/>
+          </a:prstGeom>
+        </p:spPr>
+      </p:pic>
+      <p:sp>
+        <p:nvSpPr>
+          <p:cNvPr id="16" name="Right Arrow Callout 15">
+            <a:extLst>
+              <a:ext uri="{FF2B5EF4-FFF2-40B4-BE49-F238E27FC236}">
+                <a16:creationId xmlns:a16="http://schemas.microsoft.com/office/drawing/2014/main" id="{8C253E48-6A6C-B742-A0CE-0656C80D716A}"/>
+              </a:ext>
+            </a:extLst>
+          </p:cNvPr>
+          <p:cNvSpPr/>
+          <p:nvPr/>
+        </p:nvSpPr>
+        <p:spPr>
+          <a:xfrm>
+            <a:off x="3876020" y="2286749"/>
+            <a:ext cx="1361661" cy="347870"/>
+          </a:xfrm>
+          <a:prstGeom prst="rightArrowCallout">
+            <a:avLst/>
+          </a:prstGeom>
+        </p:spPr>
+        <p:style>
+          <a:lnRef idx="2">
+            <a:schemeClr val="accent1">
+              <a:shade val="50000"/>
+            </a:schemeClr>
+          </a:lnRef>
+          <a:fillRef idx="1">
+            <a:schemeClr val="accent1"/>
+          </a:fillRef>
+          <a:effectRef idx="0">
+            <a:schemeClr val="accent1"/>
+          </a:effectRef>
+          <a:fontRef idx="minor">
+            <a:schemeClr val="lt1"/>
+          </a:fontRef>
+        </p:style>
+        <p:txBody>
+          <a:bodyPr rtlCol="0" anchor="ctr"/>
+          <a:lstStyle/>
+          <a:p>
+            <a:pPr algn="ctr">
+              <a:spcAft>
+                <a:spcPts val="600"/>
+              </a:spcAft>
+            </a:pPr>
+            <a:r>
+              <a:rPr lang="en-IL" dirty="0"/>
+              <a:t>Outlier</a:t>
+            </a:r>
+          </a:p>
+        </p:txBody>
+      </p:sp>
+    </p:spTree>
+    <p:extLst>
+      <p:ext uri="{BB962C8B-B14F-4D97-AF65-F5344CB8AC3E}">
+        <p14:creationId xmlns:p14="http://schemas.microsoft.com/office/powerpoint/2010/main" val="2656728820"/>
+      </p:ext>
+    </p:extLst>
+  </p:cSld>
+  <p:clrMapOvr>
+    <a:overrideClrMapping bg1="dk1" tx1="lt1" bg2="dk2" tx2="lt2" accent1="accent1" accent2="accent2" accent3="accent3" accent4="accent4" accent5="accent5" accent6="accent6" hlink="hlink" folHlink="folHlink"/>
+  </p:clrMapOvr>
+</p:sld>
+</file>
+
+<file path=ppt/slides/slide5.xml><?xml version="1.0" encoding="utf-8"?>
 <p:sld xmlns:a="http://schemas.openxmlformats.org/drawingml/2006/main" xmlns:r="http://schemas.openxmlformats.org/officeDocument/2006/relationships" xmlns:p="http://schemas.openxmlformats.org/presentationml/2006/main">
   <p:cSld>
     <p:bg>
@@ -7896,10 +8725,343 @@
       </p:grpSpPr>
       <p:sp>
         <p:nvSpPr>
+          <p:cNvPr id="30" name="Rectangle 29">
+            <a:extLst>
+              <a:ext uri="{FF2B5EF4-FFF2-40B4-BE49-F238E27FC236}">
+                <a16:creationId xmlns:a16="http://schemas.microsoft.com/office/drawing/2014/main" id="{DB691D59-8F51-4DD8-AD41-D568D29B08F8}"/>
+              </a:ext>
+              <a:ext uri="{C183D7F6-B498-43B3-948B-1728B52AA6E4}">
+                <adec:decorative xmlns:adec="http://schemas.microsoft.com/office/drawing/2017/decorative" val="1"/>
+              </a:ext>
+            </a:extLst>
+          </p:cNvPr>
+          <p:cNvSpPr>
+            <a:spLocks noGrp="1" noRot="1" noChangeAspect="1" noMove="1" noResize="1" noEditPoints="1" noAdjustHandles="1" noChangeArrowheads="1" noChangeShapeType="1" noTextEdit="1"/>
+          </p:cNvSpPr>
+          <p:nvPr>
+            <p:extLst>
+              <p:ext uri="{386F3935-93C4-4BCD-93E2-E3B085C9AB24}">
+                <p16:designElem xmlns:p16="http://schemas.microsoft.com/office/powerpoint/2015/main" val="1"/>
+              </p:ext>
+            </p:extLst>
+          </p:nvPr>
+        </p:nvSpPr>
+        <p:spPr>
+          <a:xfrm>
+            <a:off x="446534" y="457200"/>
+            <a:ext cx="3703320" cy="94997"/>
+          </a:xfrm>
+          <a:prstGeom prst="rect">
+            <a:avLst/>
+          </a:prstGeom>
+          <a:solidFill>
+            <a:schemeClr val="accent1"/>
+          </a:solidFill>
+          <a:ln>
+            <a:noFill/>
+          </a:ln>
+          <a:effectLst/>
+        </p:spPr>
+        <p:style>
+          <a:lnRef idx="1">
+            <a:schemeClr val="accent1"/>
+          </a:lnRef>
+          <a:fillRef idx="3">
+            <a:schemeClr val="accent1"/>
+          </a:fillRef>
+          <a:effectRef idx="2">
+            <a:schemeClr val="accent1"/>
+          </a:effectRef>
+          <a:fontRef idx="minor">
+            <a:schemeClr val="lt1"/>
+          </a:fontRef>
+        </p:style>
+      </p:sp>
+      <p:sp>
+        <p:nvSpPr>
+          <p:cNvPr id="32" name="Rectangle 31">
+            <a:extLst>
+              <a:ext uri="{FF2B5EF4-FFF2-40B4-BE49-F238E27FC236}">
+                <a16:creationId xmlns:a16="http://schemas.microsoft.com/office/drawing/2014/main" id="{204AEF18-0627-48F3-9B3D-F7E8F050B1D4}"/>
+              </a:ext>
+              <a:ext uri="{C183D7F6-B498-43B3-948B-1728B52AA6E4}">
+                <adec:decorative xmlns:adec="http://schemas.microsoft.com/office/drawing/2017/decorative" val="1"/>
+              </a:ext>
+            </a:extLst>
+          </p:cNvPr>
+          <p:cNvSpPr>
+            <a:spLocks noGrp="1" noRot="1" noChangeAspect="1" noMove="1" noResize="1" noEditPoints="1" noAdjustHandles="1" noChangeArrowheads="1" noChangeShapeType="1" noTextEdit="1"/>
+          </p:cNvSpPr>
+          <p:nvPr>
+            <p:extLst>
+              <p:ext uri="{386F3935-93C4-4BCD-93E2-E3B085C9AB24}">
+                <p16:designElem xmlns:p16="http://schemas.microsoft.com/office/powerpoint/2015/main" val="1"/>
+              </p:ext>
+            </p:extLst>
+          </p:nvPr>
+        </p:nvSpPr>
+        <p:spPr>
+          <a:xfrm>
+            <a:off x="8042147" y="453643"/>
+            <a:ext cx="3703320" cy="98554"/>
+          </a:xfrm>
+          <a:prstGeom prst="rect">
+            <a:avLst/>
+          </a:prstGeom>
+          <a:solidFill>
+            <a:schemeClr val="accent4"/>
+          </a:solidFill>
+          <a:ln>
+            <a:noFill/>
+          </a:ln>
+          <a:effectLst/>
+        </p:spPr>
+        <p:style>
+          <a:lnRef idx="1">
+            <a:schemeClr val="accent1"/>
+          </a:lnRef>
+          <a:fillRef idx="3">
+            <a:schemeClr val="accent1"/>
+          </a:fillRef>
+          <a:effectRef idx="2">
+            <a:schemeClr val="accent1"/>
+          </a:effectRef>
+          <a:fontRef idx="minor">
+            <a:schemeClr val="lt1"/>
+          </a:fontRef>
+        </p:style>
+      </p:sp>
+      <p:sp>
+        <p:nvSpPr>
+          <p:cNvPr id="34" name="Rectangle 33">
+            <a:extLst>
+              <a:ext uri="{FF2B5EF4-FFF2-40B4-BE49-F238E27FC236}">
+                <a16:creationId xmlns:a16="http://schemas.microsoft.com/office/drawing/2014/main" id="{CEAEE08A-C572-438F-9753-B0D527A515A7}"/>
+              </a:ext>
+              <a:ext uri="{C183D7F6-B498-43B3-948B-1728B52AA6E4}">
+                <adec:decorative xmlns:adec="http://schemas.microsoft.com/office/drawing/2017/decorative" val="1"/>
+              </a:ext>
+            </a:extLst>
+          </p:cNvPr>
+          <p:cNvSpPr>
+            <a:spLocks noGrp="1" noRot="1" noChangeAspect="1" noMove="1" noResize="1" noEditPoints="1" noAdjustHandles="1" noChangeArrowheads="1" noChangeShapeType="1" noTextEdit="1"/>
+          </p:cNvSpPr>
+          <p:nvPr>
+            <p:extLst>
+              <p:ext uri="{386F3935-93C4-4BCD-93E2-E3B085C9AB24}">
+                <p16:designElem xmlns:p16="http://schemas.microsoft.com/office/powerpoint/2015/main" val="1"/>
+              </p:ext>
+            </p:extLst>
+          </p:nvPr>
+        </p:nvSpPr>
+        <p:spPr>
+          <a:xfrm>
+            <a:off x="4241830" y="457200"/>
+            <a:ext cx="3703320" cy="91440"/>
+          </a:xfrm>
+          <a:prstGeom prst="rect">
+            <a:avLst/>
+          </a:prstGeom>
+          <a:solidFill>
+            <a:schemeClr val="accent2"/>
+          </a:solidFill>
+          <a:ln>
+            <a:noFill/>
+          </a:ln>
+          <a:effectLst/>
+        </p:spPr>
+        <p:style>
+          <a:lnRef idx="1">
+            <a:schemeClr val="accent1"/>
+          </a:lnRef>
+          <a:fillRef idx="3">
+            <a:schemeClr val="accent1"/>
+          </a:fillRef>
+          <a:effectRef idx="2">
+            <a:schemeClr val="accent1"/>
+          </a:effectRef>
+          <a:fontRef idx="minor">
+            <a:schemeClr val="lt1"/>
+          </a:fontRef>
+        </p:style>
+      </p:sp>
+      <p:sp>
+        <p:nvSpPr>
+          <p:cNvPr id="36" name="Rectangle 35">
+            <a:extLst>
+              <a:ext uri="{FF2B5EF4-FFF2-40B4-BE49-F238E27FC236}">
+                <a16:creationId xmlns:a16="http://schemas.microsoft.com/office/drawing/2014/main" id="{993F09C6-4F57-4B05-9592-E253D8BC6286}"/>
+              </a:ext>
+              <a:ext uri="{C183D7F6-B498-43B3-948B-1728B52AA6E4}">
+                <adec:decorative xmlns:adec="http://schemas.microsoft.com/office/drawing/2017/decorative" val="1"/>
+              </a:ext>
+            </a:extLst>
+          </p:cNvPr>
+          <p:cNvSpPr>
+            <a:spLocks noGrp="1" noRot="1" noChangeAspect="1" noMove="1" noResize="1" noEditPoints="1" noAdjustHandles="1" noChangeArrowheads="1" noChangeShapeType="1" noTextEdit="1"/>
+          </p:cNvSpPr>
+          <p:nvPr>
+            <p:extLst>
+              <p:ext uri="{386F3935-93C4-4BCD-93E2-E3B085C9AB24}">
+                <p16:designElem xmlns:p16="http://schemas.microsoft.com/office/powerpoint/2015/main" val="1"/>
+              </p:ext>
+            </p:extLst>
+          </p:nvPr>
+        </p:nvSpPr>
+        <p:spPr>
+          <a:xfrm>
+            <a:off x="440286" y="614407"/>
+            <a:ext cx="11309338" cy="1189298"/>
+          </a:xfrm>
+          <a:prstGeom prst="rect">
+            <a:avLst/>
+          </a:prstGeom>
+          <a:solidFill>
+            <a:schemeClr val="accent1"/>
+          </a:solidFill>
+          <a:ln>
+            <a:noFill/>
+          </a:ln>
+          <a:effectLst/>
+        </p:spPr>
+        <p:style>
+          <a:lnRef idx="1">
+            <a:schemeClr val="accent1"/>
+          </a:lnRef>
+          <a:fillRef idx="3">
+            <a:schemeClr val="accent1"/>
+          </a:fillRef>
+          <a:effectRef idx="2">
+            <a:schemeClr val="accent1"/>
+          </a:effectRef>
+          <a:fontRef idx="minor">
+            <a:schemeClr val="lt1"/>
+          </a:fontRef>
+        </p:style>
+      </p:sp>
+      <p:sp>
+        <p:nvSpPr>
+          <p:cNvPr id="38" name="Rectangle 37">
+            <a:extLst>
+              <a:ext uri="{FF2B5EF4-FFF2-40B4-BE49-F238E27FC236}">
+                <a16:creationId xmlns:a16="http://schemas.microsoft.com/office/drawing/2014/main" id="{636F6DB7-CF8D-494A-82F6-13B58DCA9896}"/>
+              </a:ext>
+              <a:ext uri="{C183D7F6-B498-43B3-948B-1728B52AA6E4}">
+                <adec:decorative xmlns:adec="http://schemas.microsoft.com/office/drawing/2017/decorative" val="1"/>
+              </a:ext>
+            </a:extLst>
+          </p:cNvPr>
+          <p:cNvSpPr>
+            <a:spLocks noGrp="1" noRot="1" noChangeAspect="1" noMove="1" noResize="1" noEditPoints="1" noAdjustHandles="1" noChangeArrowheads="1" noChangeShapeType="1" noTextEdit="1"/>
+          </p:cNvSpPr>
+          <p:nvPr>
+            <p:extLst>
+              <p:ext uri="{386F3935-93C4-4BCD-93E2-E3B085C9AB24}">
+                <p16:designElem xmlns:p16="http://schemas.microsoft.com/office/powerpoint/2015/main" val="1"/>
+              </p:ext>
+            </p:extLst>
+          </p:nvPr>
+        </p:nvSpPr>
+        <p:spPr>
+          <a:xfrm>
+            <a:off x="0" y="0"/>
+            <a:ext cx="12192000" cy="6858000"/>
+          </a:xfrm>
+          <a:prstGeom prst="rect">
+            <a:avLst/>
+          </a:prstGeom>
+          <a:solidFill>
+            <a:schemeClr val="tx1"/>
+          </a:solidFill>
+          <a:ln>
+            <a:noFill/>
+          </a:ln>
+        </p:spPr>
+        <p:style>
+          <a:lnRef idx="2">
+            <a:schemeClr val="accent1">
+              <a:shade val="50000"/>
+            </a:schemeClr>
+          </a:lnRef>
+          <a:fillRef idx="1">
+            <a:schemeClr val="accent1"/>
+          </a:fillRef>
+          <a:effectRef idx="0">
+            <a:schemeClr val="accent1"/>
+          </a:effectRef>
+          <a:fontRef idx="minor">
+            <a:schemeClr val="lt1"/>
+          </a:fontRef>
+        </p:style>
+        <p:txBody>
+          <a:bodyPr rtlCol="0" anchor="ctr"/>
+          <a:lstStyle/>
+          <a:p>
+            <a:pPr algn="ctr"/>
+            <a:endParaRPr lang="en-US"/>
+          </a:p>
+        </p:txBody>
+      </p:sp>
+      <p:sp>
+        <p:nvSpPr>
+          <p:cNvPr id="40" name="Rectangle 39">
+            <a:extLst>
+              <a:ext uri="{FF2B5EF4-FFF2-40B4-BE49-F238E27FC236}">
+                <a16:creationId xmlns:a16="http://schemas.microsoft.com/office/drawing/2014/main" id="{0B7E5194-6E82-4A44-99C3-FE7D87F34134}"/>
+              </a:ext>
+              <a:ext uri="{C183D7F6-B498-43B3-948B-1728B52AA6E4}">
+                <adec:decorative xmlns:adec="http://schemas.microsoft.com/office/drawing/2017/decorative" val="1"/>
+              </a:ext>
+            </a:extLst>
+          </p:cNvPr>
+          <p:cNvSpPr>
+            <a:spLocks noGrp="1" noRot="1" noChangeAspect="1" noMove="1" noResize="1" noEditPoints="1" noAdjustHandles="1" noChangeArrowheads="1" noChangeShapeType="1" noTextEdit="1"/>
+          </p:cNvSpPr>
+          <p:nvPr>
+            <p:extLst>
+              <p:ext uri="{386F3935-93C4-4BCD-93E2-E3B085C9AB24}">
+                <p16:designElem xmlns:p16="http://schemas.microsoft.com/office/powerpoint/2015/main" val="1"/>
+              </p:ext>
+            </p:extLst>
+          </p:nvPr>
+        </p:nvSpPr>
+        <p:spPr>
+          <a:xfrm>
+            <a:off x="442377" y="614407"/>
+            <a:ext cx="3707477" cy="5611772"/>
+          </a:xfrm>
+          <a:prstGeom prst="rect">
+            <a:avLst/>
+          </a:prstGeom>
+          <a:solidFill>
+            <a:schemeClr val="accent1"/>
+          </a:solidFill>
+          <a:ln>
+            <a:noFill/>
+          </a:ln>
+          <a:effectLst/>
+        </p:spPr>
+        <p:style>
+          <a:lnRef idx="1">
+            <a:schemeClr val="accent1"/>
+          </a:lnRef>
+          <a:fillRef idx="3">
+            <a:schemeClr val="accent1"/>
+          </a:fillRef>
+          <a:effectRef idx="2">
+            <a:schemeClr val="accent1"/>
+          </a:effectRef>
+          <a:fontRef idx="minor">
+            <a:schemeClr val="lt1"/>
+          </a:fontRef>
+        </p:style>
+      </p:sp>
+      <p:sp>
+        <p:nvSpPr>
           <p:cNvPr id="2" name="Title 1">
             <a:extLst>
               <a:ext uri="{FF2B5EF4-FFF2-40B4-BE49-F238E27FC236}">
-                <a16:creationId xmlns:a16="http://schemas.microsoft.com/office/drawing/2014/main" id="{AA1EB14B-8660-E94B-9721-E993E25E5D19}"/>
+                <a16:creationId xmlns:a16="http://schemas.microsoft.com/office/drawing/2014/main" id="{5C6E1396-3D15-2F47-9479-046FA62442E2}"/>
               </a:ext>
             </a:extLst>
           </p:cNvPr>
@@ -7910,7 +9072,12 @@
             <p:ph type="title"/>
           </p:nvPr>
         </p:nvSpPr>
-        <p:spPr/>
+        <p:spPr>
+          <a:xfrm>
+            <a:off x="764110" y="826346"/>
+            <a:ext cx="3171905" cy="1013800"/>
+          </a:xfrm>
+        </p:spPr>
         <p:txBody>
           <a:bodyPr vert="horz" lIns="91440" tIns="45720" rIns="91440" bIns="45720" rtlCol="0" anchor="b">
             <a:normAutofit/>
@@ -7918,22 +9085,267 @@
           <a:lstStyle/>
           <a:p>
             <a:r>
-              <a:rPr lang="en-US" sz="3600">
+              <a:rPr lang="en-US" sz="2400">
                 <a:solidFill>
                   <a:srgbClr val="FFFFFF"/>
                 </a:solidFill>
               </a:rPr>
-              <a:t>Visualisazions</a:t>
+              <a:t>Visualizations (cont.)</a:t>
+            </a:r>
+          </a:p>
+        </p:txBody>
+      </p:sp>
+      <p:grpSp>
+        <p:nvGrpSpPr>
+          <p:cNvPr id="42" name="Group 41">
+            <a:extLst>
+              <a:ext uri="{FF2B5EF4-FFF2-40B4-BE49-F238E27FC236}">
+                <a16:creationId xmlns:a16="http://schemas.microsoft.com/office/drawing/2014/main" id="{49FCC1E1-84D3-494D-A0A0-286AFA1C3018}"/>
+              </a:ext>
+              <a:ext uri="{C183D7F6-B498-43B3-948B-1728B52AA6E4}">
+                <adec:decorative xmlns:adec="http://schemas.microsoft.com/office/drawing/2017/decorative" val="1"/>
+              </a:ext>
+            </a:extLst>
+          </p:cNvPr>
+          <p:cNvGrpSpPr>
+            <a:grpSpLocks noGrp="1" noUngrp="1" noRot="1" noChangeAspect="1" noMove="1" noResize="1"/>
+          </p:cNvGrpSpPr>
+          <p:nvPr>
+            <p:extLst>
+              <p:ext uri="{386F3935-93C4-4BCD-93E2-E3B085C9AB24}">
+                <p16:designElem xmlns:p16="http://schemas.microsoft.com/office/powerpoint/2015/main" val="1"/>
+              </p:ext>
+            </p:extLst>
+          </p:nvPr>
+        </p:nvGrpSpPr>
+        <p:grpSpPr>
+          <a:xfrm>
+            <a:off x="446534" y="453643"/>
+            <a:ext cx="11298933" cy="98554"/>
+            <a:chOff x="446534" y="453643"/>
+            <a:chExt cx="11298933" cy="98554"/>
+          </a:xfrm>
+        </p:grpSpPr>
+        <p:sp>
+          <p:nvSpPr>
+            <p:cNvPr id="43" name="Rectangle 42">
+              <a:extLst>
+                <a:ext uri="{FF2B5EF4-FFF2-40B4-BE49-F238E27FC236}">
+                  <a16:creationId xmlns:a16="http://schemas.microsoft.com/office/drawing/2014/main" id="{96E09E90-FF79-402E-AF01-97A279BEADAD}"/>
+                </a:ext>
+                <a:ext uri="{C183D7F6-B498-43B3-948B-1728B52AA6E4}">
+                  <adec:decorative xmlns:adec="http://schemas.microsoft.com/office/drawing/2017/decorative" val="1"/>
+                </a:ext>
+              </a:extLst>
+            </p:cNvPr>
+            <p:cNvSpPr/>
+            <p:nvPr>
+              <p:extLst>
+                <p:ext uri="{386F3935-93C4-4BCD-93E2-E3B085C9AB24}">
+                  <p16:designElem xmlns:p16="http://schemas.microsoft.com/office/powerpoint/2015/main" val="1"/>
+                </p:ext>
+              </p:extLst>
+            </p:nvPr>
+          </p:nvSpPr>
+          <p:spPr>
+            <a:xfrm>
+              <a:off x="446534" y="457200"/>
+              <a:ext cx="3703320" cy="94997"/>
+            </a:xfrm>
+            <a:prstGeom prst="rect">
+              <a:avLst/>
+            </a:prstGeom>
+            <a:solidFill>
+              <a:schemeClr val="accent1"/>
+            </a:solidFill>
+            <a:ln>
+              <a:noFill/>
+            </a:ln>
+            <a:effectLst/>
+          </p:spPr>
+          <p:style>
+            <a:lnRef idx="1">
+              <a:schemeClr val="accent1"/>
+            </a:lnRef>
+            <a:fillRef idx="3">
+              <a:schemeClr val="accent1"/>
+            </a:fillRef>
+            <a:effectRef idx="2">
+              <a:schemeClr val="accent1"/>
+            </a:effectRef>
+            <a:fontRef idx="minor">
+              <a:schemeClr val="lt1"/>
+            </a:fontRef>
+          </p:style>
+        </p:sp>
+        <p:sp>
+          <p:nvSpPr>
+            <p:cNvPr id="44" name="Rectangle 43">
+              <a:extLst>
+                <a:ext uri="{FF2B5EF4-FFF2-40B4-BE49-F238E27FC236}">
+                  <a16:creationId xmlns:a16="http://schemas.microsoft.com/office/drawing/2014/main" id="{EC6946F8-4B9B-4C51-9F51-2DB377392CC1}"/>
+                </a:ext>
+                <a:ext uri="{C183D7F6-B498-43B3-948B-1728B52AA6E4}">
+                  <adec:decorative xmlns:adec="http://schemas.microsoft.com/office/drawing/2017/decorative" val="1"/>
+                </a:ext>
+              </a:extLst>
+            </p:cNvPr>
+            <p:cNvSpPr/>
+            <p:nvPr>
+              <p:extLst>
+                <p:ext uri="{386F3935-93C4-4BCD-93E2-E3B085C9AB24}">
+                  <p16:designElem xmlns:p16="http://schemas.microsoft.com/office/powerpoint/2015/main" val="1"/>
+                </p:ext>
+              </p:extLst>
+            </p:nvPr>
+          </p:nvSpPr>
+          <p:spPr>
+            <a:xfrm>
+              <a:off x="8042147" y="453643"/>
+              <a:ext cx="3703320" cy="98554"/>
+            </a:xfrm>
+            <a:prstGeom prst="rect">
+              <a:avLst/>
+            </a:prstGeom>
+            <a:solidFill>
+              <a:schemeClr val="accent4"/>
+            </a:solidFill>
+            <a:ln>
+              <a:noFill/>
+            </a:ln>
+            <a:effectLst/>
+          </p:spPr>
+          <p:style>
+            <a:lnRef idx="1">
+              <a:schemeClr val="accent1"/>
+            </a:lnRef>
+            <a:fillRef idx="3">
+              <a:schemeClr val="accent1"/>
+            </a:fillRef>
+            <a:effectRef idx="2">
+              <a:schemeClr val="accent1"/>
+            </a:effectRef>
+            <a:fontRef idx="minor">
+              <a:schemeClr val="lt1"/>
+            </a:fontRef>
+          </p:style>
+        </p:sp>
+        <p:sp>
+          <p:nvSpPr>
+            <p:cNvPr id="45" name="Rectangle 44">
+              <a:extLst>
+                <a:ext uri="{FF2B5EF4-FFF2-40B4-BE49-F238E27FC236}">
+                  <a16:creationId xmlns:a16="http://schemas.microsoft.com/office/drawing/2014/main" id="{7B3D2B3D-A285-438C-A344-AED3E46A0782}"/>
+                </a:ext>
+                <a:ext uri="{C183D7F6-B498-43B3-948B-1728B52AA6E4}">
+                  <adec:decorative xmlns:adec="http://schemas.microsoft.com/office/drawing/2017/decorative" val="1"/>
+                </a:ext>
+              </a:extLst>
+            </p:cNvPr>
+            <p:cNvSpPr/>
+            <p:nvPr>
+              <p:extLst>
+                <p:ext uri="{386F3935-93C4-4BCD-93E2-E3B085C9AB24}">
+                  <p16:designElem xmlns:p16="http://schemas.microsoft.com/office/powerpoint/2015/main" val="1"/>
+                </p:ext>
+              </p:extLst>
+            </p:nvPr>
+          </p:nvSpPr>
+          <p:spPr>
+            <a:xfrm>
+              <a:off x="4241830" y="457200"/>
+              <a:ext cx="3703320" cy="91440"/>
+            </a:xfrm>
+            <a:prstGeom prst="rect">
+              <a:avLst/>
+            </a:prstGeom>
+            <a:solidFill>
+              <a:schemeClr val="accent2"/>
+            </a:solidFill>
+            <a:ln>
+              <a:noFill/>
+            </a:ln>
+            <a:effectLst/>
+          </p:spPr>
+          <p:style>
+            <a:lnRef idx="1">
+              <a:schemeClr val="accent1"/>
+            </a:lnRef>
+            <a:fillRef idx="3">
+              <a:schemeClr val="accent1"/>
+            </a:fillRef>
+            <a:effectRef idx="2">
+              <a:schemeClr val="accent1"/>
+            </a:effectRef>
+            <a:fontRef idx="minor">
+              <a:schemeClr val="lt1"/>
+            </a:fontRef>
+          </p:style>
+        </p:sp>
+      </p:grpSp>
+      <p:sp>
+        <p:nvSpPr>
+          <p:cNvPr id="10" name="Content Placeholder 9">
+            <a:extLst>
+              <a:ext uri="{FF2B5EF4-FFF2-40B4-BE49-F238E27FC236}">
+                <a16:creationId xmlns:a16="http://schemas.microsoft.com/office/drawing/2014/main" id="{74F887C2-9F66-47EB-91EC-9ADF9E143926}"/>
+              </a:ext>
+            </a:extLst>
+          </p:cNvPr>
+          <p:cNvSpPr>
+            <a:spLocks noGrp="1"/>
+          </p:cNvSpPr>
+          <p:nvPr>
+            <p:ph sz="half" idx="1"/>
+          </p:nvPr>
+        </p:nvSpPr>
+        <p:spPr>
+          <a:xfrm>
+            <a:off x="764110" y="2052084"/>
+            <a:ext cx="3033249" cy="3856229"/>
+          </a:xfrm>
+        </p:spPr>
+        <p:txBody>
+          <a:bodyPr vert="horz" lIns="91440" tIns="45720" rIns="91440" bIns="45720" rtlCol="0" anchor="t">
+            <a:normAutofit/>
+          </a:bodyPr>
+          <a:lstStyle/>
+          <a:p>
+            <a:pPr marL="0" indent="0">
+              <a:buNone/>
+            </a:pPr>
+            <a:r>
+              <a:rPr lang="en-US" sz="1600" dirty="0">
+                <a:solidFill>
+                  <a:srgbClr val="FFFFFF"/>
+                </a:solidFill>
+              </a:rPr>
+              <a:t>We can see a curvilinear relationship between the temperature and the consumption.</a:t>
+            </a:r>
+            <a:br>
+              <a:rPr lang="en-US" sz="1600" dirty="0">
+                <a:solidFill>
+                  <a:srgbClr val="FFFFFF"/>
+                </a:solidFill>
+              </a:rPr>
+            </a:br>
+            <a:r>
+              <a:rPr lang="en-US" sz="1600" dirty="0">
+                <a:solidFill>
+                  <a:srgbClr val="FFFFFF"/>
+                </a:solidFill>
+              </a:rPr>
+              <a:t>The consumption is a little higher when it's colder and much higher when it's warmer.</a:t>
             </a:r>
           </a:p>
         </p:txBody>
       </p:sp>
       <p:pic>
         <p:nvPicPr>
-          <p:cNvPr id="5" name="Content Placeholder 4">
+          <p:cNvPr id="6" name="Content Placeholder 5">
             <a:extLst>
               <a:ext uri="{FF2B5EF4-FFF2-40B4-BE49-F238E27FC236}">
-                <a16:creationId xmlns:a16="http://schemas.microsoft.com/office/drawing/2014/main" id="{080347EC-B2E2-B044-8A66-DAA1B379FC57}"/>
+                <a16:creationId xmlns:a16="http://schemas.microsoft.com/office/drawing/2014/main" id="{47ED1967-03E6-1740-B826-CE7E0687696F}"/>
               </a:ext>
             </a:extLst>
           </p:cNvPr>
@@ -7941,7 +9353,7 @@
             <a:picLocks noGrp="1" noChangeAspect="1"/>
           </p:cNvPicPr>
           <p:nvPr>
-            <p:ph sz="half" idx="1"/>
+            <p:ph sz="half" idx="2"/>
           </p:nvPr>
         </p:nvPicPr>
         <p:blipFill>
@@ -7952,107 +9364,38 @@
         </p:blipFill>
         <p:spPr>
           <a:xfrm>
-            <a:off x="5975527" y="2487279"/>
-            <a:ext cx="5854801" cy="3275900"/>
+            <a:off x="4568800" y="1514324"/>
+            <a:ext cx="6866506" cy="3828077"/>
           </a:xfrm>
           <a:prstGeom prst="rect">
             <a:avLst/>
           </a:prstGeom>
         </p:spPr>
       </p:pic>
-      <p:pic>
-        <p:nvPicPr>
-          <p:cNvPr id="4" name="Content Placeholder 3">
-            <a:extLst>
-              <a:ext uri="{FF2B5EF4-FFF2-40B4-BE49-F238E27FC236}">
-                <a16:creationId xmlns:a16="http://schemas.microsoft.com/office/drawing/2014/main" id="{CDF4C66C-77E1-6A4E-A96E-320AAE4337D3}"/>
-              </a:ext>
-            </a:extLst>
-          </p:cNvPr>
-          <p:cNvPicPr>
-            <a:picLocks noChangeAspect="1"/>
-          </p:cNvPicPr>
-          <p:nvPr/>
-        </p:nvPicPr>
-        <p:blipFill rotWithShape="1">
-          <a:blip r:embed="rId3"/>
-          <a:stretch/>
-        </p:blipFill>
-        <p:spPr>
-          <a:xfrm>
-            <a:off x="159716" y="2487279"/>
-            <a:ext cx="5624858" cy="3275900"/>
-          </a:xfrm>
-          <a:prstGeom prst="rect">
-            <a:avLst/>
-          </a:prstGeom>
-        </p:spPr>
-      </p:pic>
-      <p:sp>
-        <p:nvSpPr>
-          <p:cNvPr id="10" name="Right Arrow Callout 9">
-            <a:extLst>
-              <a:ext uri="{FF2B5EF4-FFF2-40B4-BE49-F238E27FC236}">
-                <a16:creationId xmlns:a16="http://schemas.microsoft.com/office/drawing/2014/main" id="{F44C393D-D266-B74D-B75F-999ACE118762}"/>
-              </a:ext>
-            </a:extLst>
-          </p:cNvPr>
-          <p:cNvSpPr/>
-          <p:nvPr/>
-        </p:nvSpPr>
-        <p:spPr>
-          <a:xfrm>
-            <a:off x="4194313" y="4860235"/>
-            <a:ext cx="1361661" cy="347870"/>
-          </a:xfrm>
-          <a:prstGeom prst="rightArrowCallout">
-            <a:avLst/>
-          </a:prstGeom>
-        </p:spPr>
-        <p:style>
-          <a:lnRef idx="2">
-            <a:schemeClr val="accent1">
-              <a:shade val="50000"/>
-            </a:schemeClr>
-          </a:lnRef>
-          <a:fillRef idx="1">
-            <a:schemeClr val="accent1"/>
-          </a:fillRef>
-          <a:effectRef idx="0">
-            <a:schemeClr val="accent1"/>
-          </a:effectRef>
-          <a:fontRef idx="minor">
-            <a:schemeClr val="lt1"/>
-          </a:fontRef>
-        </p:style>
-        <p:txBody>
-          <a:bodyPr rtlCol="0" anchor="ctr"/>
-          <a:lstStyle/>
-          <a:p>
-            <a:pPr algn="ctr"/>
-            <a:r>
-              <a:rPr lang="en-IL" dirty="0"/>
-              <a:t>Outlier</a:t>
-            </a:r>
-          </a:p>
-        </p:txBody>
-      </p:sp>
     </p:spTree>
     <p:extLst>
       <p:ext uri="{BB962C8B-B14F-4D97-AF65-F5344CB8AC3E}">
-        <p14:creationId xmlns:p14="http://schemas.microsoft.com/office/powerpoint/2010/main" val="1868138641"/>
+        <p14:creationId xmlns:p14="http://schemas.microsoft.com/office/powerpoint/2010/main" val="431338180"/>
       </p:ext>
     </p:extLst>
   </p:cSld>
   <p:clrMapOvr>
-    <a:masterClrMapping/>
+    <a:overrideClrMapping bg1="dk1" tx1="lt1" bg2="dk2" tx2="lt2" accent1="accent1" accent2="accent2" accent3="accent3" accent4="accent4" accent5="accent5" accent6="accent6" hlink="hlink" folHlink="folHlink"/>
   </p:clrMapOvr>
 </p:sld>
 </file>
 
-<file path=ppt/slides/slide5.xml><?xml version="1.0" encoding="utf-8"?>
+<file path=ppt/slides/slide6.xml><?xml version="1.0" encoding="utf-8"?>
 <p:sld xmlns:a="http://schemas.openxmlformats.org/drawingml/2006/main" xmlns:r="http://schemas.openxmlformats.org/officeDocument/2006/relationships" xmlns:p="http://schemas.openxmlformats.org/presentationml/2006/main">
   <p:cSld>
+    <p:bg>
+      <p:bgPr>
+        <a:solidFill>
+          <a:schemeClr val="bg1"/>
+        </a:solidFill>
+        <a:effectLst/>
+      </p:bgPr>
+    </p:bg>
     <p:spTree>
       <p:nvGrpSpPr>
         <p:cNvPr id="1" name=""/>
@@ -8069,10 +9412,286 @@
       </p:grpSpPr>
       <p:sp>
         <p:nvSpPr>
+          <p:cNvPr id="10" name="Rectangle 9">
+            <a:extLst>
+              <a:ext uri="{FF2B5EF4-FFF2-40B4-BE49-F238E27FC236}">
+                <a16:creationId xmlns:a16="http://schemas.microsoft.com/office/drawing/2014/main" id="{DB691D59-8F51-4DD8-AD41-D568D29B08F8}"/>
+              </a:ext>
+              <a:ext uri="{C183D7F6-B498-43B3-948B-1728B52AA6E4}">
+                <adec:decorative xmlns:adec="http://schemas.microsoft.com/office/drawing/2017/decorative" val="1"/>
+              </a:ext>
+            </a:extLst>
+          </p:cNvPr>
+          <p:cNvSpPr>
+            <a:spLocks noGrp="1" noRot="1" noChangeAspect="1" noMove="1" noResize="1" noEditPoints="1" noAdjustHandles="1" noChangeArrowheads="1" noChangeShapeType="1" noTextEdit="1"/>
+          </p:cNvSpPr>
+          <p:nvPr>
+            <p:extLst>
+              <p:ext uri="{386F3935-93C4-4BCD-93E2-E3B085C9AB24}">
+                <p16:designElem xmlns:p16="http://schemas.microsoft.com/office/powerpoint/2015/main" val="1"/>
+              </p:ext>
+            </p:extLst>
+          </p:nvPr>
+        </p:nvSpPr>
+        <p:spPr>
+          <a:xfrm>
+            <a:off x="446534" y="457200"/>
+            <a:ext cx="3703320" cy="94997"/>
+          </a:xfrm>
+          <a:prstGeom prst="rect">
+            <a:avLst/>
+          </a:prstGeom>
+          <a:solidFill>
+            <a:schemeClr val="accent1"/>
+          </a:solidFill>
+          <a:ln>
+            <a:noFill/>
+          </a:ln>
+          <a:effectLst/>
+        </p:spPr>
+        <p:style>
+          <a:lnRef idx="1">
+            <a:schemeClr val="accent1"/>
+          </a:lnRef>
+          <a:fillRef idx="3">
+            <a:schemeClr val="accent1"/>
+          </a:fillRef>
+          <a:effectRef idx="2">
+            <a:schemeClr val="accent1"/>
+          </a:effectRef>
+          <a:fontRef idx="minor">
+            <a:schemeClr val="lt1"/>
+          </a:fontRef>
+        </p:style>
+      </p:sp>
+      <p:sp>
+        <p:nvSpPr>
+          <p:cNvPr id="12" name="Rectangle 11">
+            <a:extLst>
+              <a:ext uri="{FF2B5EF4-FFF2-40B4-BE49-F238E27FC236}">
+                <a16:creationId xmlns:a16="http://schemas.microsoft.com/office/drawing/2014/main" id="{204AEF18-0627-48F3-9B3D-F7E8F050B1D4}"/>
+              </a:ext>
+              <a:ext uri="{C183D7F6-B498-43B3-948B-1728B52AA6E4}">
+                <adec:decorative xmlns:adec="http://schemas.microsoft.com/office/drawing/2017/decorative" val="1"/>
+              </a:ext>
+            </a:extLst>
+          </p:cNvPr>
+          <p:cNvSpPr>
+            <a:spLocks noGrp="1" noRot="1" noChangeAspect="1" noMove="1" noResize="1" noEditPoints="1" noAdjustHandles="1" noChangeArrowheads="1" noChangeShapeType="1" noTextEdit="1"/>
+          </p:cNvSpPr>
+          <p:nvPr>
+            <p:extLst>
+              <p:ext uri="{386F3935-93C4-4BCD-93E2-E3B085C9AB24}">
+                <p16:designElem xmlns:p16="http://schemas.microsoft.com/office/powerpoint/2015/main" val="1"/>
+              </p:ext>
+            </p:extLst>
+          </p:nvPr>
+        </p:nvSpPr>
+        <p:spPr>
+          <a:xfrm>
+            <a:off x="8042147" y="453643"/>
+            <a:ext cx="3703320" cy="98554"/>
+          </a:xfrm>
+          <a:prstGeom prst="rect">
+            <a:avLst/>
+          </a:prstGeom>
+          <a:solidFill>
+            <a:schemeClr val="accent4"/>
+          </a:solidFill>
+          <a:ln>
+            <a:noFill/>
+          </a:ln>
+          <a:effectLst/>
+        </p:spPr>
+        <p:style>
+          <a:lnRef idx="1">
+            <a:schemeClr val="accent1"/>
+          </a:lnRef>
+          <a:fillRef idx="3">
+            <a:schemeClr val="accent1"/>
+          </a:fillRef>
+          <a:effectRef idx="2">
+            <a:schemeClr val="accent1"/>
+          </a:effectRef>
+          <a:fontRef idx="minor">
+            <a:schemeClr val="lt1"/>
+          </a:fontRef>
+        </p:style>
+      </p:sp>
+      <p:sp>
+        <p:nvSpPr>
+          <p:cNvPr id="14" name="Rectangle 13">
+            <a:extLst>
+              <a:ext uri="{FF2B5EF4-FFF2-40B4-BE49-F238E27FC236}">
+                <a16:creationId xmlns:a16="http://schemas.microsoft.com/office/drawing/2014/main" id="{CEAEE08A-C572-438F-9753-B0D527A515A7}"/>
+              </a:ext>
+              <a:ext uri="{C183D7F6-B498-43B3-948B-1728B52AA6E4}">
+                <adec:decorative xmlns:adec="http://schemas.microsoft.com/office/drawing/2017/decorative" val="1"/>
+              </a:ext>
+            </a:extLst>
+          </p:cNvPr>
+          <p:cNvSpPr>
+            <a:spLocks noGrp="1" noRot="1" noChangeAspect="1" noMove="1" noResize="1" noEditPoints="1" noAdjustHandles="1" noChangeArrowheads="1" noChangeShapeType="1" noTextEdit="1"/>
+          </p:cNvSpPr>
+          <p:nvPr>
+            <p:extLst>
+              <p:ext uri="{386F3935-93C4-4BCD-93E2-E3B085C9AB24}">
+                <p16:designElem xmlns:p16="http://schemas.microsoft.com/office/powerpoint/2015/main" val="1"/>
+              </p:ext>
+            </p:extLst>
+          </p:nvPr>
+        </p:nvSpPr>
+        <p:spPr>
+          <a:xfrm>
+            <a:off x="4241830" y="457200"/>
+            <a:ext cx="3703320" cy="91440"/>
+          </a:xfrm>
+          <a:prstGeom prst="rect">
+            <a:avLst/>
+          </a:prstGeom>
+          <a:solidFill>
+            <a:schemeClr val="accent2"/>
+          </a:solidFill>
+          <a:ln>
+            <a:noFill/>
+          </a:ln>
+          <a:effectLst/>
+        </p:spPr>
+        <p:style>
+          <a:lnRef idx="1">
+            <a:schemeClr val="accent1"/>
+          </a:lnRef>
+          <a:fillRef idx="3">
+            <a:schemeClr val="accent1"/>
+          </a:fillRef>
+          <a:effectRef idx="2">
+            <a:schemeClr val="accent1"/>
+          </a:effectRef>
+          <a:fontRef idx="minor">
+            <a:schemeClr val="lt1"/>
+          </a:fontRef>
+        </p:style>
+      </p:sp>
+      <p:sp>
+        <p:nvSpPr>
+          <p:cNvPr id="16" name="Rectangle 15">
+            <a:extLst>
+              <a:ext uri="{FF2B5EF4-FFF2-40B4-BE49-F238E27FC236}">
+                <a16:creationId xmlns:a16="http://schemas.microsoft.com/office/drawing/2014/main" id="{DB93146F-62ED-4C59-844C-0935D0FB5031}"/>
+              </a:ext>
+              <a:ext uri="{C183D7F6-B498-43B3-948B-1728B52AA6E4}">
+                <adec:decorative xmlns:adec="http://schemas.microsoft.com/office/drawing/2017/decorative" val="1"/>
+              </a:ext>
+            </a:extLst>
+          </p:cNvPr>
+          <p:cNvSpPr>
+            <a:spLocks noGrp="1" noRot="1" noChangeAspect="1" noMove="1" noResize="1" noEditPoints="1" noAdjustHandles="1" noChangeArrowheads="1" noChangeShapeType="1" noTextEdit="1"/>
+          </p:cNvSpPr>
+          <p:nvPr>
+            <p:extLst>
+              <p:ext uri="{386F3935-93C4-4BCD-93E2-E3B085C9AB24}">
+                <p16:designElem xmlns:p16="http://schemas.microsoft.com/office/powerpoint/2015/main" val="1"/>
+              </p:ext>
+            </p:extLst>
+          </p:nvPr>
+        </p:nvSpPr>
+        <p:spPr>
+          <a:xfrm>
+            <a:off x="446534" y="3085765"/>
+            <a:ext cx="11262866" cy="3304800"/>
+          </a:xfrm>
+          <a:prstGeom prst="rect">
+            <a:avLst/>
+          </a:prstGeom>
+          <a:solidFill>
+            <a:schemeClr val="accent1"/>
+          </a:solidFill>
+          <a:ln>
+            <a:noFill/>
+          </a:ln>
+          <a:effectLst/>
+        </p:spPr>
+        <p:style>
+          <a:lnRef idx="1">
+            <a:schemeClr val="accent1"/>
+          </a:lnRef>
+          <a:fillRef idx="3">
+            <a:schemeClr val="accent1"/>
+          </a:fillRef>
+          <a:effectRef idx="2">
+            <a:schemeClr val="accent1"/>
+          </a:effectRef>
+          <a:fontRef idx="minor">
+            <a:schemeClr val="lt1"/>
+          </a:fontRef>
+        </p:style>
+      </p:sp>
+      <p:sp useBgFill="1">
+        <p:nvSpPr>
+          <p:cNvPr id="18" name="Rectangle 17">
+            <a:extLst>
+              <a:ext uri="{FF2B5EF4-FFF2-40B4-BE49-F238E27FC236}">
+                <a16:creationId xmlns:a16="http://schemas.microsoft.com/office/drawing/2014/main" id="{F9CD4BEB-C391-4F7E-9838-95411A832349}"/>
+              </a:ext>
+              <a:ext uri="{C183D7F6-B498-43B3-948B-1728B52AA6E4}">
+                <adec:decorative xmlns:adec="http://schemas.microsoft.com/office/drawing/2017/decorative" val="1"/>
+              </a:ext>
+            </a:extLst>
+          </p:cNvPr>
+          <p:cNvSpPr>
+            <a:spLocks noGrp="1" noRot="1" noChangeAspect="1" noMove="1" noResize="1" noEditPoints="1" noAdjustHandles="1" noChangeArrowheads="1" noChangeShapeType="1" noTextEdit="1"/>
+          </p:cNvSpPr>
+          <p:nvPr>
+            <p:extLst>
+              <p:ext uri="{386F3935-93C4-4BCD-93E2-E3B085C9AB24}">
+                <p16:designElem xmlns:p16="http://schemas.microsoft.com/office/powerpoint/2015/main" val="1"/>
+              </p:ext>
+            </p:extLst>
+          </p:nvPr>
+        </p:nvSpPr>
+        <p:spPr>
+          <a:xfrm>
+            <a:off x="0" y="723900"/>
+            <a:ext cx="12192000" cy="6134100"/>
+          </a:xfrm>
+          <a:prstGeom prst="rect">
+            <a:avLst/>
+          </a:prstGeom>
+          <a:ln>
+            <a:noFill/>
+          </a:ln>
+        </p:spPr>
+        <p:style>
+          <a:lnRef idx="2">
+            <a:schemeClr val="accent1">
+              <a:shade val="50000"/>
+            </a:schemeClr>
+          </a:lnRef>
+          <a:fillRef idx="1">
+            <a:schemeClr val="accent1"/>
+          </a:fillRef>
+          <a:effectRef idx="0">
+            <a:schemeClr val="accent1"/>
+          </a:effectRef>
+          <a:fontRef idx="minor">
+            <a:schemeClr val="lt1"/>
+          </a:fontRef>
+        </p:style>
+        <p:txBody>
+          <a:bodyPr rtlCol="0" anchor="ctr"/>
+          <a:lstStyle/>
+          <a:p>
+            <a:pPr algn="ctr"/>
+            <a:endParaRPr lang="en-US"/>
+          </a:p>
+        </p:txBody>
+      </p:sp>
+      <p:sp>
+        <p:nvSpPr>
           <p:cNvPr id="2" name="Title 1">
             <a:extLst>
               <a:ext uri="{FF2B5EF4-FFF2-40B4-BE49-F238E27FC236}">
-                <a16:creationId xmlns:a16="http://schemas.microsoft.com/office/drawing/2014/main" id="{5C6E1396-3D15-2F47-9479-046FA62442E2}"/>
+                <a16:creationId xmlns:a16="http://schemas.microsoft.com/office/drawing/2014/main" id="{C0DDB34C-E070-9947-8BD5-D765226844C5}"/>
               </a:ext>
             </a:extLst>
           </p:cNvPr>
@@ -8083,20 +9702,68 @@
             <p:ph type="title"/>
           </p:nvPr>
         </p:nvSpPr>
-        <p:spPr/>
+        <p:spPr>
+          <a:xfrm>
+            <a:off x="581191" y="723901"/>
+            <a:ext cx="10993549" cy="1428750"/>
+          </a:xfrm>
+        </p:spPr>
         <p:txBody>
-          <a:bodyPr/>
+          <a:bodyPr vert="horz" lIns="91440" tIns="45720" rIns="91440" bIns="45720" rtlCol="0" anchor="b">
+            <a:normAutofit/>
+          </a:bodyPr>
           <a:lstStyle/>
           <a:p>
             <a:r>
-              <a:rPr lang="en-US"/>
-              <a:t>V</a:t>
+              <a:rPr lang="en-US" sz="3600">
+                <a:solidFill>
+                  <a:schemeClr val="accent1"/>
+                </a:solidFill>
+              </a:rPr>
+              <a:t>The Effect of cold temperatures on electric power consumption</a:t>
             </a:r>
+          </a:p>
+        </p:txBody>
+      </p:sp>
+      <p:sp>
+        <p:nvSpPr>
+          <p:cNvPr id="4" name="Content Placeholder 3">
+            <a:extLst>
+              <a:ext uri="{FF2B5EF4-FFF2-40B4-BE49-F238E27FC236}">
+                <a16:creationId xmlns:a16="http://schemas.microsoft.com/office/drawing/2014/main" id="{535D0492-B9DC-EC4E-A14B-27C9D5166F87}"/>
+              </a:ext>
+            </a:extLst>
+          </p:cNvPr>
+          <p:cNvSpPr>
+            <a:spLocks noGrp="1"/>
+          </p:cNvSpPr>
+          <p:nvPr>
+            <p:ph sz="half" idx="2"/>
+          </p:nvPr>
+        </p:nvSpPr>
+        <p:spPr>
+          <a:xfrm>
+            <a:off x="581194" y="2172965"/>
+            <a:ext cx="10993546" cy="525565"/>
+          </a:xfrm>
+        </p:spPr>
+        <p:txBody>
+          <a:bodyPr vert="horz" lIns="91440" tIns="45720" rIns="91440" bIns="45720" rtlCol="0" anchor="t">
+            <a:normAutofit/>
+          </a:bodyPr>
+          <a:lstStyle/>
+          <a:p>
+            <a:pPr marL="0" indent="0">
+              <a:buNone/>
+            </a:pPr>
             <a:r>
-              <a:rPr lang="en-IL"/>
-              <a:t>isualizations (cont.)</a:t>
+              <a:rPr lang="en-US" sz="1600" cap="all" dirty="0">
+                <a:solidFill>
+                  <a:schemeClr val="accent2"/>
+                </a:solidFill>
+              </a:rPr>
+              <a:t>Electric power is only used for heating in about 20% of households</a:t>
             </a:r>
-            <a:endParaRPr lang="en-IL" dirty="0"/>
           </a:p>
         </p:txBody>
       </p:sp>
@@ -8105,7 +9772,7 @@
           <p:cNvPr id="5" name="Content Placeholder 4">
             <a:extLst>
               <a:ext uri="{FF2B5EF4-FFF2-40B4-BE49-F238E27FC236}">
-                <a16:creationId xmlns:a16="http://schemas.microsoft.com/office/drawing/2014/main" id="{BC6C109E-99F9-474F-8C8F-5163396244B3}"/>
+                <a16:creationId xmlns:a16="http://schemas.microsoft.com/office/drawing/2014/main" id="{4CEEB70B-B963-EA4E-81D7-2895C5BEE10D}"/>
               </a:ext>
             </a:extLst>
           </p:cNvPr>
@@ -8124,40 +9791,8 @@
         </p:blipFill>
         <p:spPr>
           <a:xfrm>
-            <a:off x="581025" y="2454861"/>
-            <a:ext cx="5422900" cy="3178591"/>
-          </a:xfrm>
-          <a:prstGeom prst="rect">
-            <a:avLst/>
-          </a:prstGeom>
-        </p:spPr>
-      </p:pic>
-      <p:pic>
-        <p:nvPicPr>
-          <p:cNvPr id="6" name="Content Placeholder 5">
-            <a:extLst>
-              <a:ext uri="{FF2B5EF4-FFF2-40B4-BE49-F238E27FC236}">
-                <a16:creationId xmlns:a16="http://schemas.microsoft.com/office/drawing/2014/main" id="{47ED1967-03E6-1740-B826-CE7E0687696F}"/>
-              </a:ext>
-            </a:extLst>
-          </p:cNvPr>
-          <p:cNvPicPr>
-            <a:picLocks noGrp="1" noChangeAspect="1"/>
-          </p:cNvPicPr>
-          <p:nvPr>
-            <p:ph sz="half" idx="2"/>
-          </p:nvPr>
-        </p:nvPicPr>
-        <p:blipFill>
-          <a:blip r:embed="rId3"/>
-          <a:stretch>
-            <a:fillRect/>
-          </a:stretch>
-        </p:blipFill>
-        <p:spPr>
-          <a:xfrm>
-            <a:off x="6187909" y="2454861"/>
-            <a:ext cx="5422900" cy="3016645"/>
+            <a:off x="506027" y="2790605"/>
+            <a:ext cx="7466809" cy="3602736"/>
           </a:xfrm>
           <a:prstGeom prst="rect">
             <a:avLst/>
@@ -8167,7 +9802,7 @@
     </p:spTree>
     <p:extLst>
       <p:ext uri="{BB962C8B-B14F-4D97-AF65-F5344CB8AC3E}">
-        <p14:creationId xmlns:p14="http://schemas.microsoft.com/office/powerpoint/2010/main" val="2656728820"/>
+        <p14:creationId xmlns:p14="http://schemas.microsoft.com/office/powerpoint/2010/main" val="1452696096"/>
       </p:ext>
     </p:extLst>
   </p:cSld>
@@ -8177,7 +9812,7 @@
 </p:sld>
 </file>
 
-<file path=ppt/slides/slide6.xml><?xml version="1.0" encoding="utf-8"?>
+<file path=ppt/slides/slide7.xml><?xml version="1.0" encoding="utf-8"?>
 <p:sld xmlns:a="http://schemas.openxmlformats.org/drawingml/2006/main" xmlns:r="http://schemas.openxmlformats.org/officeDocument/2006/relationships" xmlns:p="http://schemas.openxmlformats.org/presentationml/2006/main">
   <p:cSld>
     <p:bg>
@@ -8668,7 +10303,7 @@
 </p:sld>
 </file>
 
-<file path=ppt/slides/slide7.xml><?xml version="1.0" encoding="utf-8"?>
+<file path=ppt/slides/slide8.xml><?xml version="1.0" encoding="utf-8"?>
 <p:sld xmlns:a="http://schemas.openxmlformats.org/drawingml/2006/main" xmlns:r="http://schemas.openxmlformats.org/officeDocument/2006/relationships" xmlns:p="http://schemas.openxmlformats.org/presentationml/2006/main">
   <p:cSld>
     <p:bg>
@@ -9117,392 +10752,6 @@
     <p:extLst>
       <p:ext uri="{BB962C8B-B14F-4D97-AF65-F5344CB8AC3E}">
         <p14:creationId xmlns:p14="http://schemas.microsoft.com/office/powerpoint/2010/main" val="3252423527"/>
-      </p:ext>
-    </p:extLst>
-  </p:cSld>
-  <p:clrMapOvr>
-    <a:masterClrMapping/>
-  </p:clrMapOvr>
-</p:sld>
-</file>
-
-<file path=ppt/slides/slide8.xml><?xml version="1.0" encoding="utf-8"?>
-<p:sld xmlns:a="http://schemas.openxmlformats.org/drawingml/2006/main" xmlns:r="http://schemas.openxmlformats.org/officeDocument/2006/relationships" xmlns:p="http://schemas.openxmlformats.org/presentationml/2006/main">
-  <p:cSld>
-    <p:spTree>
-      <p:nvGrpSpPr>
-        <p:cNvPr id="1" name=""/>
-        <p:cNvGrpSpPr/>
-        <p:nvPr/>
-      </p:nvGrpSpPr>
-      <p:grpSpPr>
-        <a:xfrm>
-          <a:off x="0" y="0"/>
-          <a:ext cx="0" cy="0"/>
-          <a:chOff x="0" y="0"/>
-          <a:chExt cx="0" cy="0"/>
-        </a:xfrm>
-      </p:grpSpPr>
-      <p:sp>
-        <p:nvSpPr>
-          <p:cNvPr id="2" name="Title 1">
-            <a:extLst>
-              <a:ext uri="{FF2B5EF4-FFF2-40B4-BE49-F238E27FC236}">
-                <a16:creationId xmlns:a16="http://schemas.microsoft.com/office/drawing/2014/main" id="{DE132533-64DB-174C-BBB8-E7E56B563E08}"/>
-              </a:ext>
-            </a:extLst>
-          </p:cNvPr>
-          <p:cNvSpPr>
-            <a:spLocks noGrp="1"/>
-          </p:cNvSpPr>
-          <p:nvPr>
-            <p:ph type="title"/>
-          </p:nvPr>
-        </p:nvSpPr>
-        <p:spPr/>
-        <p:txBody>
-          <a:bodyPr/>
-          <a:lstStyle/>
-          <a:p>
-            <a:r>
-              <a:rPr lang="en-IL" dirty="0"/>
-              <a:t>Algorythm comparison</a:t>
-            </a:r>
-          </a:p>
-        </p:txBody>
-      </p:sp>
-      <p:sp>
-        <p:nvSpPr>
-          <p:cNvPr id="3" name="Content Placeholder 2">
-            <a:extLst>
-              <a:ext uri="{FF2B5EF4-FFF2-40B4-BE49-F238E27FC236}">
-                <a16:creationId xmlns:a16="http://schemas.microsoft.com/office/drawing/2014/main" id="{51CD2BEC-4606-E143-855D-C46707E3832A}"/>
-              </a:ext>
-            </a:extLst>
-          </p:cNvPr>
-          <p:cNvSpPr>
-            <a:spLocks noGrp="1"/>
-          </p:cNvSpPr>
-          <p:nvPr>
-            <p:ph idx="1"/>
-          </p:nvPr>
-        </p:nvSpPr>
-        <p:spPr>
-          <a:xfrm>
-            <a:off x="581192" y="2180496"/>
-            <a:ext cx="7288887" cy="3678303"/>
-          </a:xfrm>
-        </p:spPr>
-        <p:txBody>
-          <a:bodyPr/>
-          <a:lstStyle/>
-          <a:p>
-            <a:r>
-              <a:rPr lang="en-US" dirty="0"/>
-              <a:t>Linear Regression 	RMSE: </a:t>
-            </a:r>
-            <a:r>
-              <a:rPr lang="en-IL" b="1" dirty="0"/>
-              <a:t>22,712</a:t>
-            </a:r>
-          </a:p>
-          <a:p>
-            <a:r>
-              <a:rPr lang="en-US" dirty="0"/>
-              <a:t>Ridge Regression 	RMSE: </a:t>
-            </a:r>
-            <a:r>
-              <a:rPr lang="en-IL" b="1" dirty="0"/>
-              <a:t>16,218</a:t>
-            </a:r>
-            <a:br>
-              <a:rPr lang="en-IL" dirty="0"/>
-            </a:br>
-            <a:r>
-              <a:rPr lang="en-IL" sz="1600" dirty="0"/>
-              <a:t>Using grid search for tuning the alpha parameter and the polynomial degree</a:t>
-            </a:r>
-            <a:endParaRPr lang="en-US" sz="1600" dirty="0"/>
-          </a:p>
-          <a:p>
-            <a:endParaRPr lang="en-IL" dirty="0"/>
-          </a:p>
-          <a:p>
-            <a:endParaRPr lang="en-US" dirty="0"/>
-          </a:p>
-          <a:p>
-            <a:endParaRPr lang="en-IL" dirty="0"/>
-          </a:p>
-        </p:txBody>
-      </p:sp>
-      <p:graphicFrame>
-        <p:nvGraphicFramePr>
-          <p:cNvPr id="5" name="Table 5">
-            <a:extLst>
-              <a:ext uri="{FF2B5EF4-FFF2-40B4-BE49-F238E27FC236}">
-                <a16:creationId xmlns:a16="http://schemas.microsoft.com/office/drawing/2014/main" id="{DD7C829D-98E6-4845-A4B4-9611073AF3FE}"/>
-              </a:ext>
-            </a:extLst>
-          </p:cNvPr>
-          <p:cNvGraphicFramePr>
-            <a:graphicFrameLocks noGrp="1"/>
-          </p:cNvGraphicFramePr>
-          <p:nvPr>
-            <p:extLst>
-              <p:ext uri="{D42A27DB-BD31-4B8C-83A1-F6EECF244321}">
-                <p14:modId xmlns:p14="http://schemas.microsoft.com/office/powerpoint/2010/main" val="1521981973"/>
-              </p:ext>
-            </p:extLst>
-          </p:nvPr>
-        </p:nvGraphicFramePr>
-        <p:xfrm>
-          <a:off x="7870079" y="2180496"/>
-          <a:ext cx="3879274" cy="1854200"/>
-        </p:xfrm>
-        <a:graphic>
-          <a:graphicData uri="http://schemas.openxmlformats.org/drawingml/2006/table">
-            <a:tbl>
-              <a:tblPr firstRow="1" firstCol="1" bandRow="1">
-                <a:tableStyleId>{5C22544A-7EE6-4342-B048-85BDC9FD1C3A}</a:tableStyleId>
-              </a:tblPr>
-              <a:tblGrid>
-                <a:gridCol w="1939637">
-                  <a:extLst>
-                    <a:ext uri="{9D8B030D-6E8A-4147-A177-3AD203B41FA5}">
-                      <a16:colId xmlns:a16="http://schemas.microsoft.com/office/drawing/2014/main" val="2626076602"/>
-                    </a:ext>
-                  </a:extLst>
-                </a:gridCol>
-                <a:gridCol w="1939637">
-                  <a:extLst>
-                    <a:ext uri="{9D8B030D-6E8A-4147-A177-3AD203B41FA5}">
-                      <a16:colId xmlns:a16="http://schemas.microsoft.com/office/drawing/2014/main" val="2363628030"/>
-                    </a:ext>
-                  </a:extLst>
-                </a:gridCol>
-              </a:tblGrid>
-              <a:tr h="370840">
-                <a:tc>
-                  <a:txBody>
-                    <a:bodyPr/>
-                    <a:lstStyle/>
-                    <a:p>
-                      <a:endParaRPr lang="en-IL" dirty="0"/>
-                    </a:p>
-                  </a:txBody>
-                  <a:tcPr/>
-                </a:tc>
-                <a:tc>
-                  <a:txBody>
-                    <a:bodyPr/>
-                    <a:lstStyle/>
-                    <a:p>
-                      <a:r>
-                        <a:rPr lang="en-US" sz="1800" b="1" i="0" kern="1200" dirty="0">
-                          <a:solidFill>
-                            <a:schemeClr val="lt1"/>
-                          </a:solidFill>
-                          <a:effectLst/>
-                          <a:latin typeface="+mn-lt"/>
-                          <a:ea typeface="+mn-ea"/>
-                          <a:cs typeface="+mn-cs"/>
-                        </a:rPr>
-                        <a:t>Consumption</a:t>
-                      </a:r>
-                      <a:endParaRPr lang="en-IL" dirty="0"/>
-                    </a:p>
-                  </a:txBody>
-                  <a:tcPr/>
-                </a:tc>
-                <a:extLst>
-                  <a:ext uri="{0D108BD9-81ED-4DB2-BD59-A6C34878D82A}">
-                    <a16:rowId xmlns:a16="http://schemas.microsoft.com/office/drawing/2014/main" val="1840083914"/>
-                  </a:ext>
-                </a:extLst>
-              </a:tr>
-              <a:tr h="370840">
-                <a:tc>
-                  <a:txBody>
-                    <a:bodyPr/>
-                    <a:lstStyle/>
-                    <a:p>
-                      <a:r>
-                        <a:rPr lang="en-IL" dirty="0"/>
-                        <a:t>Mean</a:t>
-                      </a:r>
-                    </a:p>
-                  </a:txBody>
-                  <a:tcPr/>
-                </a:tc>
-                <a:tc>
-                  <a:txBody>
-                    <a:bodyPr/>
-                    <a:lstStyle/>
-                    <a:p>
-                      <a:r>
-                        <a:rPr lang="en-IL" sz="1800" b="0" i="0" kern="1200" dirty="0">
-                          <a:solidFill>
-                            <a:schemeClr val="dk1"/>
-                          </a:solidFill>
-                          <a:effectLst/>
-                          <a:latin typeface="+mn-lt"/>
-                          <a:ea typeface="+mn-ea"/>
-                          <a:cs typeface="+mn-cs"/>
-                        </a:rPr>
-                        <a:t>280,769</a:t>
-                      </a:r>
-                      <a:endParaRPr lang="en-IL" dirty="0"/>
-                    </a:p>
-                  </a:txBody>
-                  <a:tcPr/>
-                </a:tc>
-                <a:extLst>
-                  <a:ext uri="{0D108BD9-81ED-4DB2-BD59-A6C34878D82A}">
-                    <a16:rowId xmlns:a16="http://schemas.microsoft.com/office/drawing/2014/main" val="560134848"/>
-                  </a:ext>
-                </a:extLst>
-              </a:tr>
-              <a:tr h="370840">
-                <a:tc>
-                  <a:txBody>
-                    <a:bodyPr/>
-                    <a:lstStyle/>
-                    <a:p>
-                      <a:r>
-                        <a:rPr lang="en-US" sz="1800" b="1" kern="1200" dirty="0">
-                          <a:solidFill>
-                            <a:schemeClr val="lt1"/>
-                          </a:solidFill>
-                          <a:latin typeface="+mn-lt"/>
-                          <a:ea typeface="+mn-ea"/>
-                          <a:cs typeface="+mn-cs"/>
-                        </a:rPr>
-                        <a:t>Std. deviation</a:t>
-                      </a:r>
-                    </a:p>
-                  </a:txBody>
-                  <a:tcPr/>
-                </a:tc>
-                <a:tc>
-                  <a:txBody>
-                    <a:bodyPr/>
-                    <a:lstStyle/>
-                    <a:p>
-                      <a:r>
-                        <a:rPr lang="en-IL" sz="1800" b="0" i="0" kern="1200" dirty="0">
-                          <a:solidFill>
-                            <a:schemeClr val="dk1"/>
-                          </a:solidFill>
-                          <a:effectLst/>
-                          <a:latin typeface="+mn-lt"/>
-                          <a:ea typeface="+mn-ea"/>
-                          <a:cs typeface="+mn-cs"/>
-                        </a:rPr>
-                        <a:t>41,774</a:t>
-                      </a:r>
-                      <a:endParaRPr lang="en-IL" dirty="0"/>
-                    </a:p>
-                  </a:txBody>
-                  <a:tcPr/>
-                </a:tc>
-                <a:extLst>
-                  <a:ext uri="{0D108BD9-81ED-4DB2-BD59-A6C34878D82A}">
-                    <a16:rowId xmlns:a16="http://schemas.microsoft.com/office/drawing/2014/main" val="3399343763"/>
-                  </a:ext>
-                </a:extLst>
-              </a:tr>
-              <a:tr h="370840">
-                <a:tc>
-                  <a:txBody>
-                    <a:bodyPr/>
-                    <a:lstStyle/>
-                    <a:p>
-                      <a:r>
-                        <a:rPr lang="en-IL" dirty="0"/>
-                        <a:t>Min</a:t>
-                      </a:r>
-                    </a:p>
-                  </a:txBody>
-                  <a:tcPr/>
-                </a:tc>
-                <a:tc>
-                  <a:txBody>
-                    <a:bodyPr/>
-                    <a:lstStyle/>
-                    <a:p>
-                      <a:r>
-                        <a:rPr lang="en-IL" sz="1800" b="0" i="0" kern="1200" dirty="0">
-                          <a:solidFill>
-                            <a:schemeClr val="dk1"/>
-                          </a:solidFill>
-                          <a:effectLst/>
-                          <a:latin typeface="+mn-lt"/>
-                          <a:ea typeface="+mn-ea"/>
-                          <a:cs typeface="+mn-cs"/>
-                        </a:rPr>
-                        <a:t>198,158</a:t>
-                      </a:r>
-                      <a:endParaRPr lang="en-IL" dirty="0"/>
-                    </a:p>
-                  </a:txBody>
-                  <a:tcPr/>
-                </a:tc>
-                <a:extLst>
-                  <a:ext uri="{0D108BD9-81ED-4DB2-BD59-A6C34878D82A}">
-                    <a16:rowId xmlns:a16="http://schemas.microsoft.com/office/drawing/2014/main" val="1185681779"/>
-                  </a:ext>
-                </a:extLst>
-              </a:tr>
-              <a:tr h="370840">
-                <a:tc>
-                  <a:txBody>
-                    <a:bodyPr/>
-                    <a:lstStyle/>
-                    <a:p>
-                      <a:r>
-                        <a:rPr lang="en-IL" dirty="0"/>
-                        <a:t>Max</a:t>
-                      </a:r>
-                    </a:p>
-                  </a:txBody>
-                  <a:tcPr/>
-                </a:tc>
-                <a:tc>
-                  <a:txBody>
-                    <a:bodyPr/>
-                    <a:lstStyle/>
-                    <a:p>
-                      <a:r>
-                        <a:rPr lang="en-IL" sz="1800" b="0" i="0" kern="1200" dirty="0">
-                          <a:solidFill>
-                            <a:schemeClr val="dk1"/>
-                          </a:solidFill>
-                          <a:effectLst/>
-                          <a:latin typeface="+mn-lt"/>
-                          <a:ea typeface="+mn-ea"/>
-                          <a:cs typeface="+mn-cs"/>
-                        </a:rPr>
-                        <a:t>481,122</a:t>
-                      </a:r>
-                      <a:endParaRPr lang="en-IL" dirty="0"/>
-                    </a:p>
-                  </a:txBody>
-                  <a:tcPr/>
-                </a:tc>
-                <a:extLst>
-                  <a:ext uri="{0D108BD9-81ED-4DB2-BD59-A6C34878D82A}">
-                    <a16:rowId xmlns:a16="http://schemas.microsoft.com/office/drawing/2014/main" val="1546167739"/>
-                  </a:ext>
-                </a:extLst>
-              </a:tr>
-            </a:tbl>
-          </a:graphicData>
-        </a:graphic>
-      </p:graphicFrame>
-    </p:spTree>
-    <p:extLst>
-      <p:ext uri="{BB962C8B-B14F-4D97-AF65-F5344CB8AC3E}">
-        <p14:creationId xmlns:p14="http://schemas.microsoft.com/office/powerpoint/2010/main" val="159319934"/>
       </p:ext>
     </p:extLst>
   </p:cSld>
@@ -9539,10 +10788,127 @@
       </p:grpSpPr>
       <p:sp>
         <p:nvSpPr>
+          <p:cNvPr id="32" name="Rectangle 31">
+            <a:extLst>
+              <a:ext uri="{FF2B5EF4-FFF2-40B4-BE49-F238E27FC236}">
+                <a16:creationId xmlns:a16="http://schemas.microsoft.com/office/drawing/2014/main" id="{636F6DB7-CF8D-494A-82F6-13B58DCA9896}"/>
+              </a:ext>
+              <a:ext uri="{C183D7F6-B498-43B3-948B-1728B52AA6E4}">
+                <adec:decorative xmlns:adec="http://schemas.microsoft.com/office/drawing/2017/decorative" val="1"/>
+              </a:ext>
+            </a:extLst>
+          </p:cNvPr>
+          <p:cNvSpPr>
+            <a:spLocks noGrp="1" noRot="1" noChangeAspect="1" noMove="1" noResize="1" noEditPoints="1" noAdjustHandles="1" noChangeArrowheads="1" noChangeShapeType="1" noTextEdit="1"/>
+          </p:cNvSpPr>
+          <p:nvPr>
+            <p:extLst>
+              <p:ext uri="{386F3935-93C4-4BCD-93E2-E3B085C9AB24}">
+                <p16:designElem xmlns:p16="http://schemas.microsoft.com/office/powerpoint/2015/main" val="1"/>
+              </p:ext>
+            </p:extLst>
+          </p:nvPr>
+        </p:nvSpPr>
+        <p:spPr>
+          <a:xfrm>
+            <a:off x="0" y="0"/>
+            <a:ext cx="12192000" cy="6858000"/>
+          </a:xfrm>
+          <a:prstGeom prst="rect">
+            <a:avLst/>
+          </a:prstGeom>
+          <a:solidFill>
+            <a:schemeClr val="tx1"/>
+          </a:solidFill>
+          <a:ln>
+            <a:noFill/>
+          </a:ln>
+        </p:spPr>
+        <p:style>
+          <a:lnRef idx="2">
+            <a:schemeClr val="accent1">
+              <a:shade val="50000"/>
+            </a:schemeClr>
+          </a:lnRef>
+          <a:fillRef idx="1">
+            <a:schemeClr val="accent1"/>
+          </a:fillRef>
+          <a:effectRef idx="0">
+            <a:schemeClr val="accent1"/>
+          </a:effectRef>
+          <a:fontRef idx="minor">
+            <a:schemeClr val="lt1"/>
+          </a:fontRef>
+        </p:style>
+        <p:txBody>
+          <a:bodyPr rtlCol="0" anchor="ctr"/>
+          <a:lstStyle/>
+          <a:p>
+            <a:pPr algn="ctr"/>
+            <a:endParaRPr lang="en-US"/>
+          </a:p>
+        </p:txBody>
+      </p:sp>
+      <p:sp>
+        <p:nvSpPr>
+          <p:cNvPr id="34" name="Rectangle 33">
+            <a:extLst>
+              <a:ext uri="{FF2B5EF4-FFF2-40B4-BE49-F238E27FC236}">
+                <a16:creationId xmlns:a16="http://schemas.microsoft.com/office/drawing/2014/main" id="{0B7E5194-6E82-4A44-99C3-FE7D87F34134}"/>
+              </a:ext>
+              <a:ext uri="{C183D7F6-B498-43B3-948B-1728B52AA6E4}">
+                <adec:decorative xmlns:adec="http://schemas.microsoft.com/office/drawing/2017/decorative" val="1"/>
+              </a:ext>
+            </a:extLst>
+          </p:cNvPr>
+          <p:cNvSpPr>
+            <a:spLocks noGrp="1" noRot="1" noChangeAspect="1" noMove="1" noResize="1" noEditPoints="1" noAdjustHandles="1" noChangeArrowheads="1" noChangeShapeType="1" noTextEdit="1"/>
+          </p:cNvSpPr>
+          <p:nvPr>
+            <p:extLst>
+              <p:ext uri="{386F3935-93C4-4BCD-93E2-E3B085C9AB24}">
+                <p16:designElem xmlns:p16="http://schemas.microsoft.com/office/powerpoint/2015/main" val="1"/>
+              </p:ext>
+            </p:extLst>
+          </p:nvPr>
+        </p:nvSpPr>
+        <p:spPr>
+          <a:xfrm>
+            <a:off x="442377" y="614407"/>
+            <a:ext cx="3707477" cy="5611772"/>
+          </a:xfrm>
+          <a:prstGeom prst="rect">
+            <a:avLst/>
+          </a:prstGeom>
+          <a:solidFill>
+            <a:schemeClr val="accent1"/>
+          </a:solidFill>
+          <a:ln>
+            <a:noFill/>
+          </a:ln>
+          <a:effectLst/>
+        </p:spPr>
+        <p:style>
+          <a:lnRef idx="1">
+            <a:schemeClr val="accent1"/>
+          </a:lnRef>
+          <a:fillRef idx="3">
+            <a:schemeClr val="accent1"/>
+          </a:fillRef>
+          <a:effectRef idx="2">
+            <a:schemeClr val="accent1"/>
+          </a:effectRef>
+          <a:fontRef idx="minor">
+            <a:schemeClr val="lt1"/>
+          </a:fontRef>
+        </p:style>
+      </p:sp>
+      <p:sp>
+        <p:nvSpPr>
           <p:cNvPr id="2" name="Title 1">
             <a:extLst>
               <a:ext uri="{FF2B5EF4-FFF2-40B4-BE49-F238E27FC236}">
-                <a16:creationId xmlns:a16="http://schemas.microsoft.com/office/drawing/2014/main" id="{4B4773A9-33C0-3C4D-993B-1872A43A04F1}"/>
+                <a16:creationId xmlns:a16="http://schemas.microsoft.com/office/drawing/2014/main" id="{DE132533-64DB-174C-BBB8-E7E56B563E08}"/>
               </a:ext>
             </a:extLst>
           </p:cNvPr>
@@ -9555,8 +10921,8 @@
         </p:nvSpPr>
         <p:spPr>
           <a:xfrm>
-            <a:off x="581192" y="702156"/>
-            <a:ext cx="11029616" cy="1013800"/>
+            <a:off x="764110" y="826346"/>
+            <a:ext cx="3171905" cy="1013800"/>
           </a:xfrm>
         </p:spPr>
         <p:txBody>
@@ -9566,22 +10932,210 @@
           <a:lstStyle/>
           <a:p>
             <a:r>
-              <a:rPr lang="en-IL">
+              <a:rPr lang="en-IL" sz="2400">
                 <a:solidFill>
-                  <a:srgbClr val="FFFEFF"/>
+                  <a:srgbClr val="FFFFFF"/>
                 </a:solidFill>
               </a:rPr>
-              <a:t>Improving the model</a:t>
+              <a:t>Algorythm comparison</a:t>
             </a:r>
           </a:p>
         </p:txBody>
       </p:sp>
+      <p:grpSp>
+        <p:nvGrpSpPr>
+          <p:cNvPr id="36" name="Group 35">
+            <a:extLst>
+              <a:ext uri="{FF2B5EF4-FFF2-40B4-BE49-F238E27FC236}">
+                <a16:creationId xmlns:a16="http://schemas.microsoft.com/office/drawing/2014/main" id="{49FCC1E1-84D3-494D-A0A0-286AFA1C3018}"/>
+              </a:ext>
+              <a:ext uri="{C183D7F6-B498-43B3-948B-1728B52AA6E4}">
+                <adec:decorative xmlns:adec="http://schemas.microsoft.com/office/drawing/2017/decorative" val="1"/>
+              </a:ext>
+            </a:extLst>
+          </p:cNvPr>
+          <p:cNvGrpSpPr>
+            <a:grpSpLocks noGrp="1" noUngrp="1" noRot="1" noChangeAspect="1" noMove="1" noResize="1"/>
+          </p:cNvGrpSpPr>
+          <p:nvPr>
+            <p:extLst>
+              <p:ext uri="{386F3935-93C4-4BCD-93E2-E3B085C9AB24}">
+                <p16:designElem xmlns:p16="http://schemas.microsoft.com/office/powerpoint/2015/main" val="1"/>
+              </p:ext>
+            </p:extLst>
+          </p:nvPr>
+        </p:nvGrpSpPr>
+        <p:grpSpPr>
+          <a:xfrm>
+            <a:off x="446534" y="453643"/>
+            <a:ext cx="11298933" cy="98554"/>
+            <a:chOff x="446534" y="453643"/>
+            <a:chExt cx="11298933" cy="98554"/>
+          </a:xfrm>
+        </p:grpSpPr>
+        <p:sp>
+          <p:nvSpPr>
+            <p:cNvPr id="37" name="Rectangle 36">
+              <a:extLst>
+                <a:ext uri="{FF2B5EF4-FFF2-40B4-BE49-F238E27FC236}">
+                  <a16:creationId xmlns:a16="http://schemas.microsoft.com/office/drawing/2014/main" id="{96E09E90-FF79-402E-AF01-97A279BEADAD}"/>
+                </a:ext>
+                <a:ext uri="{C183D7F6-B498-43B3-948B-1728B52AA6E4}">
+                  <adec:decorative xmlns:adec="http://schemas.microsoft.com/office/drawing/2017/decorative" val="1"/>
+                </a:ext>
+              </a:extLst>
+            </p:cNvPr>
+            <p:cNvSpPr/>
+            <p:nvPr>
+              <p:extLst>
+                <p:ext uri="{386F3935-93C4-4BCD-93E2-E3B085C9AB24}">
+                  <p16:designElem xmlns:p16="http://schemas.microsoft.com/office/powerpoint/2015/main" val="1"/>
+                </p:ext>
+              </p:extLst>
+            </p:nvPr>
+          </p:nvSpPr>
+          <p:spPr>
+            <a:xfrm>
+              <a:off x="446534" y="457200"/>
+              <a:ext cx="3703320" cy="94997"/>
+            </a:xfrm>
+            <a:prstGeom prst="rect">
+              <a:avLst/>
+            </a:prstGeom>
+            <a:solidFill>
+              <a:schemeClr val="accent1"/>
+            </a:solidFill>
+            <a:ln>
+              <a:noFill/>
+            </a:ln>
+            <a:effectLst/>
+          </p:spPr>
+          <p:style>
+            <a:lnRef idx="1">
+              <a:schemeClr val="accent1"/>
+            </a:lnRef>
+            <a:fillRef idx="3">
+              <a:schemeClr val="accent1"/>
+            </a:fillRef>
+            <a:effectRef idx="2">
+              <a:schemeClr val="accent1"/>
+            </a:effectRef>
+            <a:fontRef idx="minor">
+              <a:schemeClr val="lt1"/>
+            </a:fontRef>
+          </p:style>
+        </p:sp>
+        <p:sp>
+          <p:nvSpPr>
+            <p:cNvPr id="38" name="Rectangle 37">
+              <a:extLst>
+                <a:ext uri="{FF2B5EF4-FFF2-40B4-BE49-F238E27FC236}">
+                  <a16:creationId xmlns:a16="http://schemas.microsoft.com/office/drawing/2014/main" id="{EC6946F8-4B9B-4C51-9F51-2DB377392CC1}"/>
+                </a:ext>
+                <a:ext uri="{C183D7F6-B498-43B3-948B-1728B52AA6E4}">
+                  <adec:decorative xmlns:adec="http://schemas.microsoft.com/office/drawing/2017/decorative" val="1"/>
+                </a:ext>
+              </a:extLst>
+            </p:cNvPr>
+            <p:cNvSpPr/>
+            <p:nvPr>
+              <p:extLst>
+                <p:ext uri="{386F3935-93C4-4BCD-93E2-E3B085C9AB24}">
+                  <p16:designElem xmlns:p16="http://schemas.microsoft.com/office/powerpoint/2015/main" val="1"/>
+                </p:ext>
+              </p:extLst>
+            </p:nvPr>
+          </p:nvSpPr>
+          <p:spPr>
+            <a:xfrm>
+              <a:off x="8042147" y="453643"/>
+              <a:ext cx="3703320" cy="98554"/>
+            </a:xfrm>
+            <a:prstGeom prst="rect">
+              <a:avLst/>
+            </a:prstGeom>
+            <a:solidFill>
+              <a:schemeClr val="accent4"/>
+            </a:solidFill>
+            <a:ln>
+              <a:noFill/>
+            </a:ln>
+            <a:effectLst/>
+          </p:spPr>
+          <p:style>
+            <a:lnRef idx="1">
+              <a:schemeClr val="accent1"/>
+            </a:lnRef>
+            <a:fillRef idx="3">
+              <a:schemeClr val="accent1"/>
+            </a:fillRef>
+            <a:effectRef idx="2">
+              <a:schemeClr val="accent1"/>
+            </a:effectRef>
+            <a:fontRef idx="minor">
+              <a:schemeClr val="lt1"/>
+            </a:fontRef>
+          </p:style>
+        </p:sp>
+        <p:sp>
+          <p:nvSpPr>
+            <p:cNvPr id="39" name="Rectangle 38">
+              <a:extLst>
+                <a:ext uri="{FF2B5EF4-FFF2-40B4-BE49-F238E27FC236}">
+                  <a16:creationId xmlns:a16="http://schemas.microsoft.com/office/drawing/2014/main" id="{7B3D2B3D-A285-438C-A344-AED3E46A0782}"/>
+                </a:ext>
+                <a:ext uri="{C183D7F6-B498-43B3-948B-1728B52AA6E4}">
+                  <adec:decorative xmlns:adec="http://schemas.microsoft.com/office/drawing/2017/decorative" val="1"/>
+                </a:ext>
+              </a:extLst>
+            </p:cNvPr>
+            <p:cNvSpPr/>
+            <p:nvPr>
+              <p:extLst>
+                <p:ext uri="{386F3935-93C4-4BCD-93E2-E3B085C9AB24}">
+                  <p16:designElem xmlns:p16="http://schemas.microsoft.com/office/powerpoint/2015/main" val="1"/>
+                </p:ext>
+              </p:extLst>
+            </p:nvPr>
+          </p:nvSpPr>
+          <p:spPr>
+            <a:xfrm>
+              <a:off x="4241830" y="457200"/>
+              <a:ext cx="3703320" cy="91440"/>
+            </a:xfrm>
+            <a:prstGeom prst="rect">
+              <a:avLst/>
+            </a:prstGeom>
+            <a:solidFill>
+              <a:schemeClr val="accent2"/>
+            </a:solidFill>
+            <a:ln>
+              <a:noFill/>
+            </a:ln>
+            <a:effectLst/>
+          </p:spPr>
+          <p:style>
+            <a:lnRef idx="1">
+              <a:schemeClr val="accent1"/>
+            </a:lnRef>
+            <a:fillRef idx="3">
+              <a:schemeClr val="accent1"/>
+            </a:fillRef>
+            <a:effectRef idx="2">
+              <a:schemeClr val="accent1"/>
+            </a:effectRef>
+            <a:fontRef idx="minor">
+              <a:schemeClr val="lt1"/>
+            </a:fontRef>
+          </p:style>
+        </p:sp>
+      </p:grpSp>
       <p:graphicFrame>
         <p:nvGraphicFramePr>
-          <p:cNvPr id="5" name="Content Placeholder 2">
+          <p:cNvPr id="20" name="Table 5">
             <a:extLst>
               <a:ext uri="{FF2B5EF4-FFF2-40B4-BE49-F238E27FC236}">
-                <a16:creationId xmlns:a16="http://schemas.microsoft.com/office/drawing/2014/main" id="{C2F48519-9EB4-4EE3-B904-8DB417EF49DC}"/>
+                <a16:creationId xmlns:a16="http://schemas.microsoft.com/office/drawing/2014/main" id="{0F60C668-7BAA-754C-A057-F87DE441256E}"/>
               </a:ext>
             </a:extLst>
           </p:cNvPr>
@@ -9589,33 +11143,462 @@
             <a:graphicFrameLocks noGrp="1"/>
           </p:cNvGraphicFramePr>
           <p:nvPr>
-            <p:ph idx="1"/>
             <p:extLst>
               <p:ext uri="{D42A27DB-BD31-4B8C-83A1-F6EECF244321}">
-                <p14:modId xmlns:p14="http://schemas.microsoft.com/office/powerpoint/2010/main" val="2284010815"/>
+                <p14:modId xmlns:p14="http://schemas.microsoft.com/office/powerpoint/2010/main" val="3443975025"/>
               </p:ext>
             </p:extLst>
           </p:nvPr>
         </p:nvGraphicFramePr>
         <p:xfrm>
-          <a:off x="581025" y="2181225"/>
-          <a:ext cx="11029950" cy="3678238"/>
+          <a:off x="764110" y="2555825"/>
+          <a:ext cx="2590468" cy="2193815"/>
         </p:xfrm>
         <a:graphic>
-          <a:graphicData uri="http://schemas.openxmlformats.org/drawingml/2006/diagram">
-            <dgm:relIds xmlns:dgm="http://schemas.openxmlformats.org/drawingml/2006/diagram" xmlns:r="http://schemas.openxmlformats.org/officeDocument/2006/relationships" r:dm="rId2" r:lo="rId3" r:qs="rId4" r:cs="rId5"/>
+          <a:graphicData uri="http://schemas.openxmlformats.org/drawingml/2006/table">
+            <a:tbl>
+              <a:tblPr firstRow="1" firstCol="1" bandRow="1">
+                <a:tableStyleId>{5C22544A-7EE6-4342-B048-85BDC9FD1C3A}</a:tableStyleId>
+              </a:tblPr>
+              <a:tblGrid>
+                <a:gridCol w="851172">
+                  <a:extLst>
+                    <a:ext uri="{9D8B030D-6E8A-4147-A177-3AD203B41FA5}">
+                      <a16:colId xmlns:a16="http://schemas.microsoft.com/office/drawing/2014/main" val="2626076602"/>
+                    </a:ext>
+                  </a:extLst>
+                </a:gridCol>
+                <a:gridCol w="1739296">
+                  <a:extLst>
+                    <a:ext uri="{9D8B030D-6E8A-4147-A177-3AD203B41FA5}">
+                      <a16:colId xmlns:a16="http://schemas.microsoft.com/office/drawing/2014/main" val="2363628030"/>
+                    </a:ext>
+                  </a:extLst>
+                </a:gridCol>
+              </a:tblGrid>
+              <a:tr h="438763">
+                <a:tc>
+                  <a:txBody>
+                    <a:bodyPr/>
+                    <a:lstStyle/>
+                    <a:p>
+                      <a:endParaRPr lang="en-IL" sz="1600" dirty="0"/>
+                    </a:p>
+                  </a:txBody>
+                  <a:tcPr marL="163037" marR="163037" marT="81519" marB="81519"/>
+                </a:tc>
+                <a:tc>
+                  <a:txBody>
+                    <a:bodyPr/>
+                    <a:lstStyle/>
+                    <a:p>
+                      <a:r>
+                        <a:rPr lang="en-US" sz="1600" b="1" i="0" kern="1200">
+                          <a:solidFill>
+                            <a:schemeClr val="lt1"/>
+                          </a:solidFill>
+                          <a:effectLst/>
+                          <a:latin typeface="+mn-lt"/>
+                          <a:ea typeface="+mn-ea"/>
+                          <a:cs typeface="+mn-cs"/>
+                        </a:rPr>
+                        <a:t>Consumption</a:t>
+                      </a:r>
+                      <a:endParaRPr lang="en-IL" sz="1600"/>
+                    </a:p>
+                  </a:txBody>
+                  <a:tcPr marL="163037" marR="163037" marT="81519" marB="81519"/>
+                </a:tc>
+                <a:extLst>
+                  <a:ext uri="{0D108BD9-81ED-4DB2-BD59-A6C34878D82A}">
+                    <a16:rowId xmlns:a16="http://schemas.microsoft.com/office/drawing/2014/main" val="1840083914"/>
+                  </a:ext>
+                </a:extLst>
+              </a:tr>
+              <a:tr h="438763">
+                <a:tc>
+                  <a:txBody>
+                    <a:bodyPr/>
+                    <a:lstStyle/>
+                    <a:p>
+                      <a:r>
+                        <a:rPr lang="en-IL" sz="1600"/>
+                        <a:t>Mean</a:t>
+                      </a:r>
+                    </a:p>
+                  </a:txBody>
+                  <a:tcPr marL="163037" marR="163037" marT="81519" marB="81519"/>
+                </a:tc>
+                <a:tc>
+                  <a:txBody>
+                    <a:bodyPr/>
+                    <a:lstStyle/>
+                    <a:p>
+                      <a:r>
+                        <a:rPr lang="en-IL" sz="1600" b="0" i="0" kern="1200">
+                          <a:solidFill>
+                            <a:schemeClr val="dk1"/>
+                          </a:solidFill>
+                          <a:effectLst/>
+                          <a:latin typeface="+mn-lt"/>
+                          <a:ea typeface="+mn-ea"/>
+                          <a:cs typeface="+mn-cs"/>
+                        </a:rPr>
+                        <a:t>280,769</a:t>
+                      </a:r>
+                      <a:endParaRPr lang="en-IL" sz="1600"/>
+                    </a:p>
+                  </a:txBody>
+                  <a:tcPr marL="163037" marR="163037" marT="81519" marB="81519"/>
+                </a:tc>
+                <a:extLst>
+                  <a:ext uri="{0D108BD9-81ED-4DB2-BD59-A6C34878D82A}">
+                    <a16:rowId xmlns:a16="http://schemas.microsoft.com/office/drawing/2014/main" val="560134848"/>
+                  </a:ext>
+                </a:extLst>
+              </a:tr>
+              <a:tr h="438763">
+                <a:tc>
+                  <a:txBody>
+                    <a:bodyPr/>
+                    <a:lstStyle/>
+                    <a:p>
+                      <a:r>
+                        <a:rPr lang="en-US" sz="1600" b="1" kern="1200" dirty="0">
+                          <a:solidFill>
+                            <a:schemeClr val="lt1"/>
+                          </a:solidFill>
+                          <a:latin typeface="+mn-lt"/>
+                          <a:ea typeface="+mn-ea"/>
+                          <a:cs typeface="+mn-cs"/>
+                        </a:rPr>
+                        <a:t>SD</a:t>
+                      </a:r>
+                    </a:p>
+                  </a:txBody>
+                  <a:tcPr marL="163037" marR="163037" marT="81519" marB="81519"/>
+                </a:tc>
+                <a:tc>
+                  <a:txBody>
+                    <a:bodyPr/>
+                    <a:lstStyle/>
+                    <a:p>
+                      <a:r>
+                        <a:rPr lang="en-IL" sz="1600" b="0" i="0" kern="1200">
+                          <a:solidFill>
+                            <a:schemeClr val="dk1"/>
+                          </a:solidFill>
+                          <a:effectLst/>
+                          <a:latin typeface="+mn-lt"/>
+                          <a:ea typeface="+mn-ea"/>
+                          <a:cs typeface="+mn-cs"/>
+                        </a:rPr>
+                        <a:t>41,774</a:t>
+                      </a:r>
+                      <a:endParaRPr lang="en-IL" sz="1600"/>
+                    </a:p>
+                  </a:txBody>
+                  <a:tcPr marL="163037" marR="163037" marT="81519" marB="81519"/>
+                </a:tc>
+                <a:extLst>
+                  <a:ext uri="{0D108BD9-81ED-4DB2-BD59-A6C34878D82A}">
+                    <a16:rowId xmlns:a16="http://schemas.microsoft.com/office/drawing/2014/main" val="3399343763"/>
+                  </a:ext>
+                </a:extLst>
+              </a:tr>
+              <a:tr h="438763">
+                <a:tc>
+                  <a:txBody>
+                    <a:bodyPr/>
+                    <a:lstStyle/>
+                    <a:p>
+                      <a:r>
+                        <a:rPr lang="en-IL" sz="1600"/>
+                        <a:t>Min</a:t>
+                      </a:r>
+                    </a:p>
+                  </a:txBody>
+                  <a:tcPr marL="163037" marR="163037" marT="81519" marB="81519"/>
+                </a:tc>
+                <a:tc>
+                  <a:txBody>
+                    <a:bodyPr/>
+                    <a:lstStyle/>
+                    <a:p>
+                      <a:r>
+                        <a:rPr lang="en-IL" sz="1600" b="0" i="0" kern="1200">
+                          <a:solidFill>
+                            <a:schemeClr val="dk1"/>
+                          </a:solidFill>
+                          <a:effectLst/>
+                          <a:latin typeface="+mn-lt"/>
+                          <a:ea typeface="+mn-ea"/>
+                          <a:cs typeface="+mn-cs"/>
+                        </a:rPr>
+                        <a:t>198,158</a:t>
+                      </a:r>
+                      <a:endParaRPr lang="en-IL" sz="1600"/>
+                    </a:p>
+                  </a:txBody>
+                  <a:tcPr marL="163037" marR="163037" marT="81519" marB="81519"/>
+                </a:tc>
+                <a:extLst>
+                  <a:ext uri="{0D108BD9-81ED-4DB2-BD59-A6C34878D82A}">
+                    <a16:rowId xmlns:a16="http://schemas.microsoft.com/office/drawing/2014/main" val="1185681779"/>
+                  </a:ext>
+                </a:extLst>
+              </a:tr>
+              <a:tr h="438763">
+                <a:tc>
+                  <a:txBody>
+                    <a:bodyPr/>
+                    <a:lstStyle/>
+                    <a:p>
+                      <a:r>
+                        <a:rPr lang="en-IL" sz="1600"/>
+                        <a:t>Max</a:t>
+                      </a:r>
+                    </a:p>
+                  </a:txBody>
+                  <a:tcPr marL="163037" marR="163037" marT="81519" marB="81519"/>
+                </a:tc>
+                <a:tc>
+                  <a:txBody>
+                    <a:bodyPr/>
+                    <a:lstStyle/>
+                    <a:p>
+                      <a:r>
+                        <a:rPr lang="en-IL" sz="1600" b="0" i="0" kern="1200" dirty="0">
+                          <a:solidFill>
+                            <a:schemeClr val="dk1"/>
+                          </a:solidFill>
+                          <a:effectLst/>
+                          <a:latin typeface="+mn-lt"/>
+                          <a:ea typeface="+mn-ea"/>
+                          <a:cs typeface="+mn-cs"/>
+                        </a:rPr>
+                        <a:t>481,122</a:t>
+                      </a:r>
+                      <a:endParaRPr lang="en-IL" sz="1600" dirty="0"/>
+                    </a:p>
+                  </a:txBody>
+                  <a:tcPr marL="163037" marR="163037" marT="81519" marB="81519"/>
+                </a:tc>
+                <a:extLst>
+                  <a:ext uri="{0D108BD9-81ED-4DB2-BD59-A6C34878D82A}">
+                    <a16:rowId xmlns:a16="http://schemas.microsoft.com/office/drawing/2014/main" val="1546167739"/>
+                  </a:ext>
+                </a:extLst>
+              </a:tr>
+            </a:tbl>
           </a:graphicData>
         </a:graphic>
       </p:graphicFrame>
+      <p:sp>
+        <p:nvSpPr>
+          <p:cNvPr id="7" name="TextBox 6">
+            <a:extLst>
+              <a:ext uri="{FF2B5EF4-FFF2-40B4-BE49-F238E27FC236}">
+                <a16:creationId xmlns:a16="http://schemas.microsoft.com/office/drawing/2014/main" id="{C61B5802-A44C-5B4D-86CE-08603D53C824}"/>
+              </a:ext>
+            </a:extLst>
+          </p:cNvPr>
+          <p:cNvSpPr txBox="1"/>
+          <p:nvPr/>
+        </p:nvSpPr>
+        <p:spPr>
+          <a:xfrm>
+            <a:off x="4519258" y="1671874"/>
+            <a:ext cx="6790577" cy="3077766"/>
+          </a:xfrm>
+          <a:prstGeom prst="rect">
+            <a:avLst/>
+          </a:prstGeom>
+          <a:noFill/>
+        </p:spPr>
+        <p:txBody>
+          <a:bodyPr wrap="none" rtlCol="0">
+            <a:spAutoFit/>
+          </a:bodyPr>
+          <a:lstStyle/>
+          <a:p>
+            <a:pPr marL="322650" indent="-306000">
+              <a:lnSpc>
+                <a:spcPct val="150000"/>
+              </a:lnSpc>
+              <a:spcBef>
+                <a:spcPct val="20000"/>
+              </a:spcBef>
+              <a:spcAft>
+                <a:spcPts val="600"/>
+              </a:spcAft>
+              <a:buClr>
+                <a:schemeClr val="accent2"/>
+              </a:buClr>
+              <a:buSzPct val="92000"/>
+              <a:buFont typeface="Wingdings 2" panose="05020102010507070707" pitchFamily="18" charset="2"/>
+              <a:buChar char=""/>
+            </a:pPr>
+            <a:r>
+              <a:rPr lang="en-US" sz="2000" dirty="0">
+                <a:solidFill>
+                  <a:schemeClr val="accent2">
+                    <a:lumMod val="50000"/>
+                  </a:schemeClr>
+                </a:solidFill>
+              </a:rPr>
+              <a:t>Linear Regression 	RMSE: </a:t>
+            </a:r>
+            <a:r>
+              <a:rPr lang="en-IL" sz="2000" b="1" dirty="0">
+                <a:solidFill>
+                  <a:schemeClr val="accent2">
+                    <a:lumMod val="50000"/>
+                  </a:schemeClr>
+                </a:solidFill>
+              </a:rPr>
+              <a:t>22,712</a:t>
+            </a:r>
+          </a:p>
+          <a:p>
+            <a:pPr marL="322650" indent="-306000">
+              <a:lnSpc>
+                <a:spcPct val="150000"/>
+              </a:lnSpc>
+              <a:spcBef>
+                <a:spcPct val="20000"/>
+              </a:spcBef>
+              <a:spcAft>
+                <a:spcPts val="600"/>
+              </a:spcAft>
+              <a:buClr>
+                <a:schemeClr val="accent2"/>
+              </a:buClr>
+              <a:buSzPct val="92000"/>
+              <a:buFont typeface="Wingdings 2" panose="05020102010507070707" pitchFamily="18" charset="2"/>
+              <a:buChar char=""/>
+            </a:pPr>
+            <a:r>
+              <a:rPr lang="en-US" sz="2000" dirty="0">
+                <a:solidFill>
+                  <a:schemeClr val="accent2">
+                    <a:lumMod val="50000"/>
+                  </a:schemeClr>
+                </a:solidFill>
+              </a:rPr>
+              <a:t>Ridge Regression 	RMSE: </a:t>
+            </a:r>
+            <a:r>
+              <a:rPr lang="en-IL" sz="2000" b="1" dirty="0">
+                <a:solidFill>
+                  <a:schemeClr val="accent2">
+                    <a:lumMod val="50000"/>
+                  </a:schemeClr>
+                </a:solidFill>
+              </a:rPr>
+              <a:t>16,218</a:t>
+            </a:r>
+            <a:br>
+              <a:rPr lang="en-IL" sz="2000" dirty="0">
+                <a:solidFill>
+                  <a:schemeClr val="accent2">
+                    <a:lumMod val="50000"/>
+                  </a:schemeClr>
+                </a:solidFill>
+              </a:rPr>
+            </a:br>
+            <a:r>
+              <a:rPr lang="en-IL" sz="1600" dirty="0">
+                <a:solidFill>
+                  <a:schemeClr val="accent2">
+                    <a:lumMod val="50000"/>
+                  </a:schemeClr>
+                </a:solidFill>
+              </a:rPr>
+              <a:t>Grid search used for tuning the alpha parameter and the polynomial degree</a:t>
+            </a:r>
+            <a:br>
+              <a:rPr lang="en-IL" sz="1600" dirty="0">
+                <a:solidFill>
+                  <a:schemeClr val="accent2">
+                    <a:lumMod val="50000"/>
+                  </a:schemeClr>
+                </a:solidFill>
+              </a:rPr>
+            </a:br>
+            <a:r>
+              <a:rPr lang="en-IL" sz="1600" dirty="0">
+                <a:solidFill>
+                  <a:schemeClr val="accent2">
+                    <a:lumMod val="50000"/>
+                  </a:schemeClr>
+                </a:solidFill>
+              </a:rPr>
+              <a:t>Best parameters: alpha: 0.3981, degree: 9</a:t>
+            </a:r>
+            <a:endParaRPr lang="en-US" sz="1600" dirty="0">
+              <a:solidFill>
+                <a:schemeClr val="accent2">
+                  <a:lumMod val="50000"/>
+                </a:schemeClr>
+              </a:solidFill>
+            </a:endParaRPr>
+          </a:p>
+          <a:p>
+            <a:pPr marL="285750" indent="-285750">
+              <a:buFont typeface="Arial" panose="020B0604020202020204" pitchFamily="34" charset="0"/>
+              <a:buChar char="•"/>
+            </a:pPr>
+            <a:endParaRPr lang="en-IL" dirty="0">
+              <a:solidFill>
+                <a:schemeClr val="accent1"/>
+              </a:solidFill>
+            </a:endParaRPr>
+          </a:p>
+          <a:p>
+            <a:pPr marL="285750" indent="-285750">
+              <a:buFont typeface="Arial" panose="020B0604020202020204" pitchFamily="34" charset="0"/>
+              <a:buChar char="•"/>
+            </a:pPr>
+            <a:endParaRPr lang="en-US" dirty="0">
+              <a:solidFill>
+                <a:schemeClr val="accent1"/>
+              </a:solidFill>
+            </a:endParaRPr>
+          </a:p>
+          <a:p>
+            <a:pPr marL="285750" indent="-285750">
+              <a:buFont typeface="Arial" panose="020B0604020202020204" pitchFamily="34" charset="0"/>
+              <a:buChar char="•"/>
+            </a:pPr>
+            <a:endParaRPr lang="en-IL" dirty="0">
+              <a:solidFill>
+                <a:schemeClr val="accent1"/>
+              </a:solidFill>
+            </a:endParaRPr>
+          </a:p>
+          <a:p>
+            <a:pPr marL="285750" indent="-285750">
+              <a:buFont typeface="Arial" panose="020B0604020202020204" pitchFamily="34" charset="0"/>
+              <a:buChar char="•"/>
+            </a:pPr>
+            <a:endParaRPr lang="en-IL" dirty="0">
+              <a:solidFill>
+                <a:schemeClr val="accent1"/>
+              </a:solidFill>
+            </a:endParaRPr>
+          </a:p>
+        </p:txBody>
+      </p:sp>
     </p:spTree>
     <p:extLst>
       <p:ext uri="{BB962C8B-B14F-4D97-AF65-F5344CB8AC3E}">
-        <p14:creationId xmlns:p14="http://schemas.microsoft.com/office/powerpoint/2010/main" val="269441500"/>
+        <p14:creationId xmlns:p14="http://schemas.microsoft.com/office/powerpoint/2010/main" val="159319934"/>
       </p:ext>
     </p:extLst>
   </p:cSld>
   <p:clrMapOvr>
-    <a:masterClrMapping/>
+    <a:overrideClrMapping bg1="dk1" tx1="lt1" bg2="dk2" tx2="lt2" accent1="accent1" accent2="accent2" accent3="accent3" accent4="accent4" accent5="accent5" accent6="accent6" hlink="hlink" folHlink="folHlink"/>
   </p:clrMapOvr>
 </p:sld>
 </file>

</xml_diff>